<commit_message>
Extended the second exercise
</commit_message>
<xml_diff>
--- a/presentations/pptx/01-Syntax, functions, loops, data types.pptx
+++ b/presentations/pptx/01-Syntax, functions, loops, data types.pptx
@@ -284,35 +284,35 @@
           <a:p>
             <a:pPr lvl="0"/>
             <a:r>
-              <a:rPr lang="en-US" smtClean="0"/>
+              <a:rPr lang="en-US"/>
               <a:t>Edit Master text styles</a:t>
             </a:r>
           </a:p>
           <a:p>
             <a:pPr lvl="1"/>
             <a:r>
-              <a:rPr lang="en-US" smtClean="0"/>
+              <a:rPr lang="en-US"/>
               <a:t>Second level</a:t>
             </a:r>
           </a:p>
           <a:p>
             <a:pPr lvl="2"/>
             <a:r>
-              <a:rPr lang="en-US" smtClean="0"/>
+              <a:rPr lang="en-US"/>
               <a:t>Third level</a:t>
             </a:r>
           </a:p>
           <a:p>
             <a:pPr lvl="3"/>
             <a:r>
-              <a:rPr lang="en-US" smtClean="0"/>
+              <a:rPr lang="en-US"/>
               <a:t>Fourth level</a:t>
             </a:r>
           </a:p>
           <a:p>
             <a:pPr lvl="4"/>
             <a:r>
-              <a:rPr lang="en-US" smtClean="0"/>
+              <a:rPr lang="en-US"/>
               <a:t>Fifth level</a:t>
             </a:r>
             <a:endParaRPr lang="he-IL"/>
@@ -796,10 +796,9 @@
           </a:lstStyle>
           <a:p>
             <a:r>
-              <a:rPr lang="en-US" dirty="0" smtClean="0"/>
+              <a:rPr lang="en-US" dirty="0"/>
               <a:t>Click to edit Master title style</a:t>
             </a:r>
-            <a:endParaRPr lang="en-US" dirty="0"/>
           </a:p>
         </p:txBody>
       </p:sp>
@@ -869,7 +868,7 @@
           </a:lstStyle>
           <a:p>
             <a:r>
-              <a:rPr lang="en-US" smtClean="0"/>
+              <a:rPr lang="en-US"/>
               <a:t>Click to edit Master subtitle style</a:t>
             </a:r>
             <a:endParaRPr lang="en-US" dirty="0"/>
@@ -915,7 +914,7 @@
           <a:lstStyle/>
           <a:p>
             <a:r>
-              <a:rPr lang="en-US" smtClean="0"/>
+              <a:rPr lang="en-US"/>
               <a:t>Materials by Adi Sarid https://adisarid.github.io and http://www.sarid-ins.com</a:t>
             </a:r>
             <a:endParaRPr lang="en-US" dirty="0"/>
@@ -1014,13 +1013,6 @@
   <p:clrMapOvr>
     <a:masterClrMapping/>
   </p:clrMapOvr>
-  <p:timing>
-    <p:tnLst>
-      <p:par>
-        <p:cTn id="1" dur="indefinite" restart="never" nodeType="tmRoot"/>
-      </p:par>
-    </p:tnLst>
-  </p:timing>
 </p:sldLayout>
 </file>
 
@@ -1057,7 +1049,7 @@
           <a:lstStyle/>
           <a:p>
             <a:r>
-              <a:rPr lang="en-US" smtClean="0"/>
+              <a:rPr lang="en-US"/>
               <a:t>Click to edit Master title style</a:t>
             </a:r>
             <a:endParaRPr lang="en-US" dirty="0"/>
@@ -1081,35 +1073,35 @@
           <a:p>
             <a:pPr lvl="0"/>
             <a:r>
-              <a:rPr lang="en-US" smtClean="0"/>
+              <a:rPr lang="en-US"/>
               <a:t>Edit Master text styles</a:t>
             </a:r>
           </a:p>
           <a:p>
             <a:pPr lvl="1"/>
             <a:r>
-              <a:rPr lang="en-US" smtClean="0"/>
+              <a:rPr lang="en-US"/>
               <a:t>Second level</a:t>
             </a:r>
           </a:p>
           <a:p>
             <a:pPr lvl="2"/>
             <a:r>
-              <a:rPr lang="en-US" smtClean="0"/>
+              <a:rPr lang="en-US"/>
               <a:t>Third level</a:t>
             </a:r>
           </a:p>
           <a:p>
             <a:pPr lvl="3"/>
             <a:r>
-              <a:rPr lang="en-US" smtClean="0"/>
+              <a:rPr lang="en-US"/>
               <a:t>Fourth level</a:t>
             </a:r>
           </a:p>
           <a:p>
             <a:pPr lvl="4"/>
             <a:r>
-              <a:rPr lang="en-US" smtClean="0"/>
+              <a:rPr lang="en-US"/>
               <a:t>Fifth level</a:t>
             </a:r>
             <a:endParaRPr lang="en-US" dirty="0"/>
@@ -1155,7 +1147,7 @@
           <a:lstStyle/>
           <a:p>
             <a:r>
-              <a:rPr lang="en-US" smtClean="0"/>
+              <a:rPr lang="en-US"/>
               <a:t>Materials by Adi Sarid https://adisarid.github.io and http://www.sarid-ins.com</a:t>
             </a:r>
             <a:endParaRPr lang="en-US" dirty="0"/>
@@ -1231,7 +1223,7 @@
           <a:lstStyle/>
           <a:p>
             <a:r>
-              <a:rPr lang="en-US" smtClean="0"/>
+              <a:rPr lang="en-US"/>
               <a:t>Click to edit Master title style</a:t>
             </a:r>
             <a:endParaRPr lang="en-US" dirty="0"/>
@@ -1260,35 +1252,35 @@
           <a:p>
             <a:pPr lvl="0"/>
             <a:r>
-              <a:rPr lang="en-US" smtClean="0"/>
+              <a:rPr lang="en-US"/>
               <a:t>Edit Master text styles</a:t>
             </a:r>
           </a:p>
           <a:p>
             <a:pPr lvl="1"/>
             <a:r>
-              <a:rPr lang="en-US" smtClean="0"/>
+              <a:rPr lang="en-US"/>
               <a:t>Second level</a:t>
             </a:r>
           </a:p>
           <a:p>
             <a:pPr lvl="2"/>
             <a:r>
-              <a:rPr lang="en-US" smtClean="0"/>
+              <a:rPr lang="en-US"/>
               <a:t>Third level</a:t>
             </a:r>
           </a:p>
           <a:p>
             <a:pPr lvl="3"/>
             <a:r>
-              <a:rPr lang="en-US" smtClean="0"/>
+              <a:rPr lang="en-US"/>
               <a:t>Fourth level</a:t>
             </a:r>
           </a:p>
           <a:p>
             <a:pPr lvl="4"/>
             <a:r>
-              <a:rPr lang="en-US" smtClean="0"/>
+              <a:rPr lang="en-US"/>
               <a:t>Fifth level</a:t>
             </a:r>
             <a:endParaRPr lang="en-US" dirty="0"/>
@@ -1334,7 +1326,7 @@
           <a:lstStyle/>
           <a:p>
             <a:r>
-              <a:rPr lang="en-US" smtClean="0"/>
+              <a:rPr lang="en-US"/>
               <a:t>Materials by Adi Sarid https://adisarid.github.io and http://www.sarid-ins.com</a:t>
             </a:r>
             <a:endParaRPr lang="en-US" dirty="0"/>
@@ -1405,7 +1397,7 @@
           <a:lstStyle/>
           <a:p>
             <a:r>
-              <a:rPr lang="en-US" smtClean="0"/>
+              <a:rPr lang="en-US"/>
               <a:t>Click to edit Master title style</a:t>
             </a:r>
             <a:endParaRPr lang="en-US" dirty="0"/>
@@ -1429,35 +1421,35 @@
           <a:p>
             <a:pPr lvl="0"/>
             <a:r>
-              <a:rPr lang="en-US" smtClean="0"/>
+              <a:rPr lang="en-US"/>
               <a:t>Edit Master text styles</a:t>
             </a:r>
           </a:p>
           <a:p>
             <a:pPr lvl="1"/>
             <a:r>
-              <a:rPr lang="en-US" smtClean="0"/>
+              <a:rPr lang="en-US"/>
               <a:t>Second level</a:t>
             </a:r>
           </a:p>
           <a:p>
             <a:pPr lvl="2"/>
             <a:r>
-              <a:rPr lang="en-US" smtClean="0"/>
+              <a:rPr lang="en-US"/>
               <a:t>Third level</a:t>
             </a:r>
           </a:p>
           <a:p>
             <a:pPr lvl="3"/>
             <a:r>
-              <a:rPr lang="en-US" smtClean="0"/>
+              <a:rPr lang="en-US"/>
               <a:t>Fourth level</a:t>
             </a:r>
           </a:p>
           <a:p>
             <a:pPr lvl="4"/>
             <a:r>
-              <a:rPr lang="en-US" smtClean="0"/>
+              <a:rPr lang="en-US"/>
               <a:t>Fifth level</a:t>
             </a:r>
             <a:endParaRPr lang="en-US" dirty="0"/>
@@ -1503,7 +1495,7 @@
           <a:lstStyle/>
           <a:p>
             <a:r>
-              <a:rPr lang="en-US" smtClean="0"/>
+              <a:rPr lang="en-US"/>
               <a:t>Materials by Adi Sarid https://adisarid.github.io and http://www.sarid-ins.com</a:t>
             </a:r>
             <a:endParaRPr lang="en-US" dirty="0"/>
@@ -1538,13 +1530,6 @@
   <p:clrMapOvr>
     <a:masterClrMapping/>
   </p:clrMapOvr>
-  <p:timing>
-    <p:tnLst>
-      <p:par>
-        <p:cTn id="1" dur="indefinite" restart="never" nodeType="tmRoot"/>
-      </p:par>
-    </p:tnLst>
-  </p:timing>
 </p:sldLayout>
 </file>
 
@@ -1652,7 +1637,7 @@
           </a:lstStyle>
           <a:p>
             <a:r>
-              <a:rPr lang="en-US" smtClean="0"/>
+              <a:rPr lang="en-US"/>
               <a:t>Click to edit Master title style</a:t>
             </a:r>
             <a:endParaRPr lang="en-US" dirty="0"/>
@@ -1774,7 +1759,7 @@
           <a:p>
             <a:pPr lvl="0"/>
             <a:r>
-              <a:rPr lang="en-US" smtClean="0"/>
+              <a:rPr lang="en-US"/>
               <a:t>Edit Master text styles</a:t>
             </a:r>
           </a:p>
@@ -1849,7 +1834,7 @@
           </a:lstStyle>
           <a:p>
             <a:r>
-              <a:rPr lang="en-US" smtClean="0"/>
+              <a:rPr lang="en-US"/>
               <a:t>Materials by Adi Sarid https://adisarid.github.io and http://www.sarid-ins.com</a:t>
             </a:r>
             <a:endParaRPr lang="en-US" dirty="0"/>
@@ -2032,13 +2017,6 @@
   <p:clrMapOvr>
     <a:masterClrMapping/>
   </p:clrMapOvr>
-  <p:timing>
-    <p:tnLst>
-      <p:par>
-        <p:cTn id="1" dur="indefinite" restart="never" nodeType="tmRoot"/>
-      </p:par>
-    </p:tnLst>
-  </p:timing>
 </p:sldLayout>
 </file>
 
@@ -2075,7 +2053,7 @@
           <a:lstStyle/>
           <a:p>
             <a:r>
-              <a:rPr lang="en-US" smtClean="0"/>
+              <a:rPr lang="en-US"/>
               <a:t>Click to edit Master title style</a:t>
             </a:r>
             <a:endParaRPr lang="en-US" dirty="0"/>
@@ -2132,35 +2110,35 @@
           <a:p>
             <a:pPr lvl="0"/>
             <a:r>
-              <a:rPr lang="en-US" smtClean="0"/>
+              <a:rPr lang="en-US"/>
               <a:t>Edit Master text styles</a:t>
             </a:r>
           </a:p>
           <a:p>
             <a:pPr lvl="1"/>
             <a:r>
-              <a:rPr lang="en-US" smtClean="0"/>
+              <a:rPr lang="en-US"/>
               <a:t>Second level</a:t>
             </a:r>
           </a:p>
           <a:p>
             <a:pPr lvl="2"/>
             <a:r>
-              <a:rPr lang="en-US" smtClean="0"/>
+              <a:rPr lang="en-US"/>
               <a:t>Third level</a:t>
             </a:r>
           </a:p>
           <a:p>
             <a:pPr lvl="3"/>
             <a:r>
-              <a:rPr lang="en-US" smtClean="0"/>
+              <a:rPr lang="en-US"/>
               <a:t>Fourth level</a:t>
             </a:r>
           </a:p>
           <a:p>
             <a:pPr lvl="4"/>
             <a:r>
-              <a:rPr lang="en-US" smtClean="0"/>
+              <a:rPr lang="en-US"/>
               <a:t>Fifth level</a:t>
             </a:r>
             <a:endParaRPr lang="en-US" dirty="0"/>
@@ -2217,35 +2195,35 @@
           <a:p>
             <a:pPr lvl="0"/>
             <a:r>
-              <a:rPr lang="en-US" smtClean="0"/>
+              <a:rPr lang="en-US"/>
               <a:t>Edit Master text styles</a:t>
             </a:r>
           </a:p>
           <a:p>
             <a:pPr lvl="1"/>
             <a:r>
-              <a:rPr lang="en-US" smtClean="0"/>
+              <a:rPr lang="en-US"/>
               <a:t>Second level</a:t>
             </a:r>
           </a:p>
           <a:p>
             <a:pPr lvl="2"/>
             <a:r>
-              <a:rPr lang="en-US" smtClean="0"/>
+              <a:rPr lang="en-US"/>
               <a:t>Third level</a:t>
             </a:r>
           </a:p>
           <a:p>
             <a:pPr lvl="3"/>
             <a:r>
-              <a:rPr lang="en-US" smtClean="0"/>
+              <a:rPr lang="en-US"/>
               <a:t>Fourth level</a:t>
             </a:r>
           </a:p>
           <a:p>
             <a:pPr lvl="4"/>
             <a:r>
-              <a:rPr lang="en-US" smtClean="0"/>
+              <a:rPr lang="en-US"/>
               <a:t>Fifth level</a:t>
             </a:r>
             <a:endParaRPr lang="en-US" dirty="0"/>
@@ -2291,7 +2269,7 @@
           <a:lstStyle/>
           <a:p>
             <a:r>
-              <a:rPr lang="en-US" smtClean="0"/>
+              <a:rPr lang="en-US"/>
               <a:t>Materials by Adi Sarid https://adisarid.github.io and http://www.sarid-ins.com</a:t>
             </a:r>
             <a:endParaRPr lang="en-US" dirty="0"/>
@@ -2326,13 +2304,6 @@
   <p:clrMapOvr>
     <a:masterClrMapping/>
   </p:clrMapOvr>
-  <p:timing>
-    <p:tnLst>
-      <p:par>
-        <p:cTn id="1" dur="indefinite" restart="never" nodeType="tmRoot"/>
-      </p:par>
-    </p:tnLst>
-  </p:timing>
 </p:sldLayout>
 </file>
 
@@ -2369,7 +2340,7 @@
           <a:lstStyle/>
           <a:p>
             <a:r>
-              <a:rPr lang="en-US" smtClean="0"/>
+              <a:rPr lang="en-US"/>
               <a:t>Click to edit Master title style</a:t>
             </a:r>
             <a:endParaRPr lang="en-US" dirty="0"/>
@@ -2443,7 +2414,7 @@
           <a:p>
             <a:pPr lvl="0"/>
             <a:r>
-              <a:rPr lang="en-US" smtClean="0"/>
+              <a:rPr lang="en-US"/>
               <a:t>Edit Master text styles</a:t>
             </a:r>
           </a:p>
@@ -2499,35 +2470,35 @@
           <a:p>
             <a:pPr lvl="0"/>
             <a:r>
-              <a:rPr lang="en-US" smtClean="0"/>
+              <a:rPr lang="en-US"/>
               <a:t>Edit Master text styles</a:t>
             </a:r>
           </a:p>
           <a:p>
             <a:pPr lvl="1"/>
             <a:r>
-              <a:rPr lang="en-US" smtClean="0"/>
+              <a:rPr lang="en-US"/>
               <a:t>Second level</a:t>
             </a:r>
           </a:p>
           <a:p>
             <a:pPr lvl="2"/>
             <a:r>
-              <a:rPr lang="en-US" smtClean="0"/>
+              <a:rPr lang="en-US"/>
               <a:t>Third level</a:t>
             </a:r>
           </a:p>
           <a:p>
             <a:pPr lvl="3"/>
             <a:r>
-              <a:rPr lang="en-US" smtClean="0"/>
+              <a:rPr lang="en-US"/>
               <a:t>Fourth level</a:t>
             </a:r>
           </a:p>
           <a:p>
             <a:pPr lvl="4"/>
             <a:r>
-              <a:rPr lang="en-US" smtClean="0"/>
+              <a:rPr lang="en-US"/>
               <a:t>Fifth level</a:t>
             </a:r>
             <a:endParaRPr lang="en-US" dirty="0"/>
@@ -2601,7 +2572,7 @@
           <a:p>
             <a:pPr lvl="0"/>
             <a:r>
-              <a:rPr lang="en-US" smtClean="0"/>
+              <a:rPr lang="en-US"/>
               <a:t>Edit Master text styles</a:t>
             </a:r>
           </a:p>
@@ -2657,35 +2628,35 @@
           <a:p>
             <a:pPr lvl="0"/>
             <a:r>
-              <a:rPr lang="en-US" smtClean="0"/>
+              <a:rPr lang="en-US"/>
               <a:t>Edit Master text styles</a:t>
             </a:r>
           </a:p>
           <a:p>
             <a:pPr lvl="1"/>
             <a:r>
-              <a:rPr lang="en-US" smtClean="0"/>
+              <a:rPr lang="en-US"/>
               <a:t>Second level</a:t>
             </a:r>
           </a:p>
           <a:p>
             <a:pPr lvl="2"/>
             <a:r>
-              <a:rPr lang="en-US" smtClean="0"/>
+              <a:rPr lang="en-US"/>
               <a:t>Third level</a:t>
             </a:r>
           </a:p>
           <a:p>
             <a:pPr lvl="3"/>
             <a:r>
-              <a:rPr lang="en-US" smtClean="0"/>
+              <a:rPr lang="en-US"/>
               <a:t>Fourth level</a:t>
             </a:r>
           </a:p>
           <a:p>
             <a:pPr lvl="4"/>
             <a:r>
-              <a:rPr lang="en-US" smtClean="0"/>
+              <a:rPr lang="en-US"/>
               <a:t>Fifth level</a:t>
             </a:r>
             <a:endParaRPr lang="en-US" dirty="0"/>
@@ -2731,7 +2702,7 @@
           <a:lstStyle/>
           <a:p>
             <a:r>
-              <a:rPr lang="en-US" smtClean="0"/>
+              <a:rPr lang="en-US"/>
               <a:t>Materials by Adi Sarid https://adisarid.github.io and http://www.sarid-ins.com</a:t>
             </a:r>
             <a:endParaRPr lang="en-US" dirty="0"/>
@@ -2802,7 +2773,7 @@
           <a:lstStyle/>
           <a:p>
             <a:r>
-              <a:rPr lang="en-US" smtClean="0"/>
+              <a:rPr lang="en-US"/>
               <a:t>Click to edit Master title style</a:t>
             </a:r>
             <a:endParaRPr lang="en-US" dirty="0"/>
@@ -2848,7 +2819,7 @@
           <a:lstStyle/>
           <a:p>
             <a:r>
-              <a:rPr lang="en-US" smtClean="0"/>
+              <a:rPr lang="en-US"/>
               <a:t>Materials by Adi Sarid https://adisarid.github.io and http://www.sarid-ins.com</a:t>
             </a:r>
             <a:endParaRPr lang="en-US" dirty="0"/>
@@ -2942,7 +2913,7 @@
           <a:lstStyle/>
           <a:p>
             <a:r>
-              <a:rPr lang="en-US" smtClean="0"/>
+              <a:rPr lang="en-US"/>
               <a:t>Materials by Adi Sarid https://adisarid.github.io and http://www.sarid-ins.com</a:t>
             </a:r>
             <a:endParaRPr lang="en-US" dirty="0"/>
@@ -3081,7 +3052,7 @@
           </a:lstStyle>
           <a:p>
             <a:r>
-              <a:rPr lang="en-US" smtClean="0"/>
+              <a:rPr lang="en-US"/>
               <a:t>Click to edit Master title style</a:t>
             </a:r>
             <a:endParaRPr lang="en-US" dirty="0"/>
@@ -3138,35 +3109,35 @@
           <a:p>
             <a:pPr lvl="0"/>
             <a:r>
-              <a:rPr lang="en-US" smtClean="0"/>
+              <a:rPr lang="en-US"/>
               <a:t>Edit Master text styles</a:t>
             </a:r>
           </a:p>
           <a:p>
             <a:pPr lvl="1"/>
             <a:r>
-              <a:rPr lang="en-US" smtClean="0"/>
+              <a:rPr lang="en-US"/>
               <a:t>Second level</a:t>
             </a:r>
           </a:p>
           <a:p>
             <a:pPr lvl="2"/>
             <a:r>
-              <a:rPr lang="en-US" smtClean="0"/>
+              <a:rPr lang="en-US"/>
               <a:t>Third level</a:t>
             </a:r>
           </a:p>
           <a:p>
             <a:pPr lvl="3"/>
             <a:r>
-              <a:rPr lang="en-US" smtClean="0"/>
+              <a:rPr lang="en-US"/>
               <a:t>Fourth level</a:t>
             </a:r>
           </a:p>
           <a:p>
             <a:pPr lvl="4"/>
             <a:r>
-              <a:rPr lang="en-US" smtClean="0"/>
+              <a:rPr lang="en-US"/>
               <a:t>Fifth level</a:t>
             </a:r>
             <a:endParaRPr lang="en-US" dirty="0"/>
@@ -3246,7 +3217,7 @@
           <a:p>
             <a:pPr lvl="0"/>
             <a:r>
-              <a:rPr lang="en-US" smtClean="0"/>
+              <a:rPr lang="en-US"/>
               <a:t>Edit Master text styles</a:t>
             </a:r>
           </a:p>
@@ -3291,7 +3262,7 @@
           <a:lstStyle/>
           <a:p>
             <a:r>
-              <a:rPr lang="en-US" smtClean="0"/>
+              <a:rPr lang="en-US"/>
               <a:t>Materials by Adi Sarid https://adisarid.github.io and http://www.sarid-ins.com</a:t>
             </a:r>
             <a:endParaRPr lang="en-US" dirty="0"/>
@@ -3469,13 +3440,6 @@
   <p:clrMapOvr>
     <a:masterClrMapping/>
   </p:clrMapOvr>
-  <p:timing>
-    <p:tnLst>
-      <p:par>
-        <p:cTn id="1" dur="indefinite" restart="never" nodeType="tmRoot"/>
-      </p:par>
-    </p:tnLst>
-  </p:timing>
 </p:sldLayout>
 </file>
 
@@ -3580,7 +3544,7 @@
           </a:lstStyle>
           <a:p>
             <a:r>
-              <a:rPr lang="en-US" smtClean="0"/>
+              <a:rPr lang="en-US"/>
               <a:t>Click to edit Master title style</a:t>
             </a:r>
             <a:endParaRPr lang="en-US" dirty="0"/>
@@ -3651,7 +3615,7 @@
           </a:lstStyle>
           <a:p>
             <a:r>
-              <a:rPr lang="en-US" smtClean="0"/>
+              <a:rPr lang="en-US"/>
               <a:t>Click icon to add picture</a:t>
             </a:r>
             <a:endParaRPr lang="en-US" dirty="0"/>
@@ -3731,7 +3695,7 @@
           <a:p>
             <a:pPr lvl="0"/>
             <a:r>
-              <a:rPr lang="en-US" smtClean="0"/>
+              <a:rPr lang="en-US"/>
               <a:t>Edit Master text styles</a:t>
             </a:r>
           </a:p>
@@ -3941,13 +3905,6 @@
   <p:clrMapOvr>
     <a:masterClrMapping/>
   </p:clrMapOvr>
-  <p:timing>
-    <p:tnLst>
-      <p:par>
-        <p:cTn id="1" dur="indefinite" restart="never" nodeType="tmRoot"/>
-      </p:par>
-    </p:tnLst>
-  </p:timing>
 </p:sldLayout>
 </file>
 
@@ -3999,10 +3956,9 @@
           <a:lstStyle/>
           <a:p>
             <a:r>
-              <a:rPr lang="en-US" dirty="0" smtClean="0"/>
+              <a:rPr lang="en-US" dirty="0"/>
               <a:t>Click to edit Master title style</a:t>
             </a:r>
-            <a:endParaRPr lang="en-US" dirty="0"/>
           </a:p>
         </p:txBody>
       </p:sp>
@@ -4033,35 +3989,35 @@
           <a:p>
             <a:pPr lvl="0"/>
             <a:r>
-              <a:rPr lang="en-US" smtClean="0"/>
+              <a:rPr lang="en-US"/>
               <a:t>Edit Master text styles</a:t>
             </a:r>
           </a:p>
           <a:p>
             <a:pPr lvl="1"/>
             <a:r>
-              <a:rPr lang="en-US" smtClean="0"/>
+              <a:rPr lang="en-US"/>
               <a:t>Second level</a:t>
             </a:r>
           </a:p>
           <a:p>
             <a:pPr lvl="2"/>
             <a:r>
-              <a:rPr lang="en-US" smtClean="0"/>
+              <a:rPr lang="en-US"/>
               <a:t>Third level</a:t>
             </a:r>
           </a:p>
           <a:p>
             <a:pPr lvl="3"/>
             <a:r>
-              <a:rPr lang="en-US" smtClean="0"/>
+              <a:rPr lang="en-US"/>
               <a:t>Fourth level</a:t>
             </a:r>
           </a:p>
           <a:p>
             <a:pPr lvl="4"/>
             <a:r>
-              <a:rPr lang="en-US" smtClean="0"/>
+              <a:rPr lang="en-US"/>
               <a:t>Fifth level</a:t>
             </a:r>
             <a:endParaRPr lang="en-US" dirty="0"/>
@@ -4143,7 +4099,7 @@
           </a:lstStyle>
           <a:p>
             <a:r>
-              <a:rPr lang="en-US" smtClean="0"/>
+              <a:rPr lang="en-US"/>
               <a:t>Materials by Adi Sarid https://adisarid.github.io and http://www.sarid-ins.com</a:t>
             </a:r>
             <a:endParaRPr lang="en-US" dirty="0"/>
@@ -4350,13 +4306,6 @@
     <p:sldLayoutId id="2147483850" r:id="rId10"/>
     <p:sldLayoutId id="2147483851" r:id="rId11"/>
   </p:sldLayoutIdLst>
-  <p:timing>
-    <p:tnLst>
-      <p:par>
-        <p:cTn id="1" dur="indefinite" restart="never" nodeType="tmRoot"/>
-      </p:par>
-    </p:tnLst>
-  </p:timing>
   <p:hf hdr="0" dt="0"/>
   <p:txStyles>
     <p:titleStyle>
@@ -4748,21 +4697,21 @@
           <a:lstStyle/>
           <a:p>
             <a:r>
-              <a:rPr lang="en-US" sz="4400" dirty="0" smtClean="0"/>
+              <a:rPr lang="en-US" sz="4400" dirty="0"/>
               <a:t>Before we start… </a:t>
             </a:r>
             <a:br>
-              <a:rPr lang="en-US" sz="4400" dirty="0" smtClean="0"/>
+              <a:rPr lang="en-US" sz="4400" dirty="0"/>
             </a:br>
             <a:r>
-              <a:rPr lang="en-US" sz="3200" dirty="0" smtClean="0"/>
+              <a:rPr lang="en-US" sz="3200" dirty="0"/>
               <a:t>following the introduction lesson</a:t>
             </a:r>
             <a:br>
-              <a:rPr lang="en-US" sz="3200" dirty="0" smtClean="0"/>
+              <a:rPr lang="en-US" sz="3200" dirty="0"/>
             </a:br>
             <a:r>
-              <a:rPr lang="en-US" sz="2000" dirty="0" smtClean="0"/>
+              <a:rPr lang="en-US" sz="2000" dirty="0"/>
               <a:t>(This slide will be an exercise for the intermediate group)</a:t>
             </a:r>
             <a:endParaRPr lang="he-IL" sz="2800" dirty="0"/>
@@ -4785,58 +4734,58 @@
           <a:lstStyle/>
           <a:p>
             <a:r>
-              <a:rPr lang="en-US" dirty="0" smtClean="0"/>
+              <a:rPr lang="en-US" dirty="0"/>
               <a:t>In the last exercise you opened up a new R project</a:t>
             </a:r>
           </a:p>
           <a:p>
             <a:pPr lvl="1"/>
             <a:r>
-              <a:rPr lang="en-US" dirty="0" smtClean="0"/>
+              <a:rPr lang="en-US" dirty="0"/>
               <a:t>R projects are a good practice, but why is that? answer the following questions</a:t>
             </a:r>
           </a:p>
           <a:p>
             <a:r>
-              <a:rPr lang="en-US" dirty="0" smtClean="0"/>
+              <a:rPr lang="en-US" dirty="0"/>
               <a:t>Explain why analysis should save scripts rather than environments.</a:t>
             </a:r>
           </a:p>
           <a:p>
             <a:r>
-              <a:rPr lang="en-US" dirty="0" smtClean="0"/>
+              <a:rPr lang="en-US" dirty="0"/>
               <a:t>Explain what a </a:t>
             </a:r>
             <a:r>
-              <a:rPr lang="en-US" i="1" dirty="0" smtClean="0"/>
+              <a:rPr lang="en-US" i="1" dirty="0"/>
               <a:t>working directory</a:t>
             </a:r>
             <a:r>
-              <a:rPr lang="en-US" dirty="0" smtClean="0"/>
+              <a:rPr lang="en-US" dirty="0"/>
               <a:t> is.</a:t>
             </a:r>
           </a:p>
           <a:p>
             <a:r>
-              <a:rPr lang="en-US" dirty="0" smtClean="0"/>
+              <a:rPr lang="en-US" dirty="0"/>
               <a:t>Why is </a:t>
             </a:r>
             <a:r>
-              <a:rPr lang="en-US" i="1" dirty="0" err="1" smtClean="0"/>
+              <a:rPr lang="en-US" i="1" dirty="0" err="1"/>
               <a:t>setwd</a:t>
             </a:r>
             <a:r>
-              <a:rPr lang="en-US" i="1" dirty="0" smtClean="0"/>
+              <a:rPr lang="en-US" i="1" dirty="0"/>
               <a:t>()</a:t>
             </a:r>
             <a:r>
-              <a:rPr lang="en-US" dirty="0" smtClean="0"/>
+              <a:rPr lang="en-US" dirty="0"/>
               <a:t> a bad idea to use in your scripts?</a:t>
             </a:r>
           </a:p>
           <a:p>
             <a:r>
-              <a:rPr lang="en-US" dirty="0" smtClean="0"/>
+              <a:rPr lang="en-US" dirty="0"/>
               <a:t>Explain the difference between an absolute path and a relative path</a:t>
             </a:r>
             <a:endParaRPr lang="he-IL" dirty="0"/>
@@ -4859,7 +4808,7 @@
           <a:lstStyle/>
           <a:p>
             <a:r>
-              <a:rPr lang="en-US" smtClean="0"/>
+              <a:rPr lang="en-US"/>
               <a:t>Materials by Adi Sarid https://adisarid.github.io and http://www.sarid-ins.com</a:t>
             </a:r>
             <a:endParaRPr lang="en-US" dirty="0"/>
@@ -5032,7 +4981,7 @@
           <a:lstStyle/>
           <a:p>
             <a:r>
-              <a:rPr lang="en-US" dirty="0" smtClean="0"/>
+              <a:rPr lang="en-US" dirty="0"/>
               <a:t>3 minutes</a:t>
             </a:r>
             <a:endParaRPr lang="he-IL" dirty="0"/>
@@ -5263,18 +5212,14 @@
           <a:lstStyle/>
           <a:p>
             <a:r>
-              <a:rPr lang="en-US" dirty="0" smtClean="0"/>
+              <a:rPr lang="en-US" dirty="0"/>
               <a:t>Iterations (loops)</a:t>
             </a:r>
-            <a:r>
-              <a:rPr lang="en-US" sz="4000" dirty="0" smtClean="0"/>
-              <a:t/>
-            </a:r>
             <a:br>
-              <a:rPr lang="en-US" sz="4000" dirty="0" smtClean="0"/>
+              <a:rPr lang="en-US" sz="4000" dirty="0"/>
             </a:br>
             <a:r>
-              <a:rPr lang="en-US" sz="3200" dirty="0" smtClean="0"/>
+              <a:rPr lang="en-US" sz="3200" dirty="0"/>
               <a:t>Which of the following are iterations?</a:t>
             </a:r>
             <a:endParaRPr lang="he-IL" sz="3200" dirty="0"/>
@@ -5302,7 +5247,7 @@
           <a:lstStyle/>
           <a:p>
             <a:r>
-              <a:rPr lang="en-US" dirty="0" smtClean="0"/>
+              <a:rPr lang="en-US" dirty="0"/>
               <a:t>Try to run them in an R Script and see what their output is</a:t>
             </a:r>
           </a:p>
@@ -5324,7 +5269,7 @@
           <a:lstStyle/>
           <a:p>
             <a:r>
-              <a:rPr lang="en-US" smtClean="0"/>
+              <a:rPr lang="en-US"/>
               <a:t>Materials by Adi Sarid https://adisarid.github.io and http://www.sarid-ins.com</a:t>
             </a:r>
             <a:endParaRPr lang="en-US" dirty="0"/>
@@ -5529,7 +5474,7 @@
           <a:lstStyle/>
           <a:p>
             <a:r>
-              <a:rPr lang="en-US" dirty="0" smtClean="0">
+              <a:rPr lang="en-US" dirty="0">
                 <a:latin typeface="Courier New" panose="02070309020205020404" pitchFamily="49" charset="0"/>
                 <a:cs typeface="Courier New" panose="02070309020205020404" pitchFamily="49" charset="0"/>
               </a:rPr>
@@ -5538,21 +5483,21 @@
           </a:p>
           <a:p>
             <a:r>
-              <a:rPr lang="en-US" dirty="0" smtClean="0">
+              <a:rPr lang="en-US" dirty="0">
                 <a:latin typeface="Courier New" panose="02070309020205020404" pitchFamily="49" charset="0"/>
                 <a:cs typeface="Courier New" panose="02070309020205020404" pitchFamily="49" charset="0"/>
               </a:rPr>
               <a:t>for (</a:t>
             </a:r>
             <a:r>
-              <a:rPr lang="en-US" dirty="0" err="1" smtClean="0">
+              <a:rPr lang="en-US" dirty="0" err="1">
                 <a:latin typeface="Courier New" panose="02070309020205020404" pitchFamily="49" charset="0"/>
                 <a:cs typeface="Courier New" panose="02070309020205020404" pitchFamily="49" charset="0"/>
               </a:rPr>
               <a:t>i</a:t>
             </a:r>
             <a:r>
-              <a:rPr lang="en-US" dirty="0" smtClean="0">
+              <a:rPr lang="en-US" dirty="0">
                 <a:latin typeface="Courier New" panose="02070309020205020404" pitchFamily="49" charset="0"/>
                 <a:cs typeface="Courier New" panose="02070309020205020404" pitchFamily="49" charset="0"/>
               </a:rPr>
@@ -5561,20 +5506,16 @@
           </a:p>
           <a:p>
             <a:r>
-              <a:rPr lang="en-US" dirty="0" smtClean="0">
+              <a:rPr lang="en-US" dirty="0">
                 <a:latin typeface="Courier New" panose="02070309020205020404" pitchFamily="49" charset="0"/>
                 <a:cs typeface="Courier New" panose="02070309020205020404" pitchFamily="49" charset="0"/>
               </a:rPr>
               <a:t>   a &lt;- a+1</a:t>
             </a:r>
-            <a:endParaRPr lang="en-US" dirty="0">
-              <a:latin typeface="Courier New" panose="02070309020205020404" pitchFamily="49" charset="0"/>
-              <a:cs typeface="Courier New" panose="02070309020205020404" pitchFamily="49" charset="0"/>
-            </a:endParaRPr>
-          </a:p>
-          <a:p>
-            <a:r>
-              <a:rPr lang="en-US" dirty="0" smtClean="0">
+          </a:p>
+          <a:p>
+            <a:r>
+              <a:rPr lang="en-US" dirty="0">
                 <a:latin typeface="Courier New" panose="02070309020205020404" pitchFamily="49" charset="0"/>
                 <a:cs typeface="Courier New" panose="02070309020205020404" pitchFamily="49" charset="0"/>
               </a:rPr>
@@ -5610,7 +5551,7 @@
           <a:lstStyle/>
           <a:p>
             <a:r>
-              <a:rPr lang="en-US" dirty="0" smtClean="0">
+              <a:rPr lang="en-US" dirty="0">
                 <a:latin typeface="Courier New" panose="02070309020205020404" pitchFamily="49" charset="0"/>
                 <a:cs typeface="Courier New" panose="02070309020205020404" pitchFamily="49" charset="0"/>
               </a:rPr>
@@ -5619,7 +5560,7 @@
           </a:p>
           <a:p>
             <a:r>
-              <a:rPr lang="en-US" dirty="0" smtClean="0">
+              <a:rPr lang="en-US" dirty="0">
                 <a:latin typeface="Courier New" panose="02070309020205020404" pitchFamily="49" charset="0"/>
                 <a:cs typeface="Courier New" panose="02070309020205020404" pitchFamily="49" charset="0"/>
               </a:rPr>
@@ -5628,20 +5569,16 @@
           </a:p>
           <a:p>
             <a:r>
-              <a:rPr lang="en-US" dirty="0" smtClean="0">
+              <a:rPr lang="en-US" dirty="0">
                 <a:latin typeface="Courier New" panose="02070309020205020404" pitchFamily="49" charset="0"/>
                 <a:cs typeface="Courier New" panose="02070309020205020404" pitchFamily="49" charset="0"/>
               </a:rPr>
               <a:t>   a &lt;- a+1</a:t>
             </a:r>
-            <a:endParaRPr lang="en-US" dirty="0">
-              <a:latin typeface="Courier New" panose="02070309020205020404" pitchFamily="49" charset="0"/>
-              <a:cs typeface="Courier New" panose="02070309020205020404" pitchFamily="49" charset="0"/>
-            </a:endParaRPr>
-          </a:p>
-          <a:p>
-            <a:r>
-              <a:rPr lang="en-US" dirty="0" smtClean="0">
+          </a:p>
+          <a:p>
+            <a:r>
+              <a:rPr lang="en-US" dirty="0">
                 <a:latin typeface="Courier New" panose="02070309020205020404" pitchFamily="49" charset="0"/>
                 <a:cs typeface="Courier New" panose="02070309020205020404" pitchFamily="49" charset="0"/>
               </a:rPr>
@@ -5700,37 +5637,19 @@
           </a:p>
           <a:p>
             <a:r>
-              <a:rPr lang="en-US" dirty="0" err="1" smtClean="0">
+              <a:rPr lang="en-US" dirty="0" err="1">
                 <a:latin typeface="Courier New" panose="02070309020205020404" pitchFamily="49" charset="0"/>
                 <a:cs typeface="Courier New" panose="02070309020205020404" pitchFamily="49" charset="0"/>
               </a:rPr>
               <a:t>map_dbl</a:t>
             </a:r>
             <a:r>
-              <a:rPr lang="en-US" dirty="0" smtClean="0">
-                <a:latin typeface="Courier New" panose="02070309020205020404" pitchFamily="49" charset="0"/>
-                <a:cs typeface="Courier New" panose="02070309020205020404" pitchFamily="49" charset="0"/>
-              </a:rPr>
-              <a:t>(1:100</a:t>
-            </a:r>
-            <a:r>
               <a:rPr lang="en-US" dirty="0">
                 <a:latin typeface="Courier New" panose="02070309020205020404" pitchFamily="49" charset="0"/>
                 <a:cs typeface="Courier New" panose="02070309020205020404" pitchFamily="49" charset="0"/>
               </a:rPr>
-              <a:t>, </a:t>
-            </a:r>
-            <a:r>
-              <a:rPr lang="en-US" dirty="0" smtClean="0">
-                <a:latin typeface="Courier New" panose="02070309020205020404" pitchFamily="49" charset="0"/>
-                <a:cs typeface="Courier New" panose="02070309020205020404" pitchFamily="49" charset="0"/>
-              </a:rPr>
-              <a:t>function(a){a+1})</a:t>
-            </a:r>
-            <a:endParaRPr lang="en-US" dirty="0">
-              <a:latin typeface="Courier New" panose="02070309020205020404" pitchFamily="49" charset="0"/>
-              <a:cs typeface="Courier New" panose="02070309020205020404" pitchFamily="49" charset="0"/>
-            </a:endParaRPr>
+              <a:t>(1:100, function(a){a+1})</a:t>
+            </a:r>
           </a:p>
         </p:txBody>
       </p:sp>
@@ -5757,7 +5676,7 @@
           <a:lstStyle/>
           <a:p>
             <a:r>
-              <a:rPr lang="en-US" dirty="0" smtClean="0">
+              <a:rPr lang="en-US" dirty="0">
                 <a:latin typeface="Courier New" panose="02070309020205020404" pitchFamily="49" charset="0"/>
                 <a:cs typeface="Courier New" panose="02070309020205020404" pitchFamily="49" charset="0"/>
               </a:rPr>
@@ -5766,7 +5685,7 @@
           </a:p>
           <a:p>
             <a:r>
-              <a:rPr lang="en-US" dirty="0" smtClean="0">
+              <a:rPr lang="en-US" dirty="0">
                 <a:latin typeface="Courier New" panose="02070309020205020404" pitchFamily="49" charset="0"/>
                 <a:cs typeface="Courier New" panose="02070309020205020404" pitchFamily="49" charset="0"/>
               </a:rPr>
@@ -5789,13 +5708,6 @@
   <p:clrMapOvr>
     <a:masterClrMapping/>
   </p:clrMapOvr>
-  <p:timing>
-    <p:tnLst>
-      <p:par>
-        <p:cTn id="1" dur="indefinite" restart="never" nodeType="tmRoot"/>
-      </p:par>
-    </p:tnLst>
-  </p:timing>
 </p:sld>
 </file>
 
@@ -5834,18 +5746,14 @@
           <a:lstStyle/>
           <a:p>
             <a:r>
-              <a:rPr lang="en-US" dirty="0" smtClean="0"/>
+              <a:rPr lang="en-US" dirty="0"/>
               <a:t>Iterations (loops)</a:t>
             </a:r>
-            <a:r>
-              <a:rPr lang="en-US" sz="4000" dirty="0" smtClean="0"/>
-              <a:t/>
-            </a:r>
             <a:br>
-              <a:rPr lang="en-US" sz="4000" dirty="0" smtClean="0"/>
+              <a:rPr lang="en-US" sz="4000" dirty="0"/>
             </a:br>
             <a:r>
-              <a:rPr lang="en-US" sz="3200" dirty="0" smtClean="0"/>
+              <a:rPr lang="en-US" sz="3200" dirty="0"/>
               <a:t>Which of the following are iterations?</a:t>
             </a:r>
             <a:endParaRPr lang="he-IL" sz="3200" dirty="0"/>
@@ -5873,7 +5781,7 @@
           <a:lstStyle/>
           <a:p>
             <a:r>
-              <a:rPr lang="en-US" dirty="0" smtClean="0"/>
+              <a:rPr lang="en-US" dirty="0"/>
               <a:t>Try to run them in an R Script and see what their output is</a:t>
             </a:r>
           </a:p>
@@ -5895,7 +5803,7 @@
           <a:lstStyle/>
           <a:p>
             <a:r>
-              <a:rPr lang="en-US" smtClean="0"/>
+              <a:rPr lang="en-US"/>
               <a:t>Materials by Adi Sarid https://adisarid.github.io and http://www.sarid-ins.com</a:t>
             </a:r>
             <a:endParaRPr lang="en-US" dirty="0"/>
@@ -6100,7 +6008,7 @@
           <a:lstStyle/>
           <a:p>
             <a:r>
-              <a:rPr lang="en-US" dirty="0" smtClean="0">
+              <a:rPr lang="en-US" dirty="0">
                 <a:latin typeface="Courier New" panose="02070309020205020404" pitchFamily="49" charset="0"/>
                 <a:cs typeface="Courier New" panose="02070309020205020404" pitchFamily="49" charset="0"/>
               </a:rPr>
@@ -6109,21 +6017,21 @@
           </a:p>
           <a:p>
             <a:r>
-              <a:rPr lang="en-US" dirty="0" smtClean="0">
+              <a:rPr lang="en-US" dirty="0">
                 <a:latin typeface="Courier New" panose="02070309020205020404" pitchFamily="49" charset="0"/>
                 <a:cs typeface="Courier New" panose="02070309020205020404" pitchFamily="49" charset="0"/>
               </a:rPr>
               <a:t>for (</a:t>
             </a:r>
             <a:r>
-              <a:rPr lang="en-US" dirty="0" err="1" smtClean="0">
+              <a:rPr lang="en-US" dirty="0" err="1">
                 <a:latin typeface="Courier New" panose="02070309020205020404" pitchFamily="49" charset="0"/>
                 <a:cs typeface="Courier New" panose="02070309020205020404" pitchFamily="49" charset="0"/>
               </a:rPr>
               <a:t>i</a:t>
             </a:r>
             <a:r>
-              <a:rPr lang="en-US" dirty="0" smtClean="0">
+              <a:rPr lang="en-US" dirty="0">
                 <a:latin typeface="Courier New" panose="02070309020205020404" pitchFamily="49" charset="0"/>
                 <a:cs typeface="Courier New" panose="02070309020205020404" pitchFamily="49" charset="0"/>
               </a:rPr>
@@ -6132,20 +6040,16 @@
           </a:p>
           <a:p>
             <a:r>
-              <a:rPr lang="en-US" dirty="0" smtClean="0">
+              <a:rPr lang="en-US" dirty="0">
                 <a:latin typeface="Courier New" panose="02070309020205020404" pitchFamily="49" charset="0"/>
                 <a:cs typeface="Courier New" panose="02070309020205020404" pitchFamily="49" charset="0"/>
               </a:rPr>
               <a:t>   a &lt;- a+1</a:t>
             </a:r>
-            <a:endParaRPr lang="en-US" dirty="0">
-              <a:latin typeface="Courier New" panose="02070309020205020404" pitchFamily="49" charset="0"/>
-              <a:cs typeface="Courier New" panose="02070309020205020404" pitchFamily="49" charset="0"/>
-            </a:endParaRPr>
-          </a:p>
-          <a:p>
-            <a:r>
-              <a:rPr lang="en-US" dirty="0" smtClean="0">
+          </a:p>
+          <a:p>
+            <a:r>
+              <a:rPr lang="en-US" dirty="0">
                 <a:latin typeface="Courier New" panose="02070309020205020404" pitchFamily="49" charset="0"/>
                 <a:cs typeface="Courier New" panose="02070309020205020404" pitchFamily="49" charset="0"/>
               </a:rPr>
@@ -6181,7 +6085,7 @@
           <a:lstStyle/>
           <a:p>
             <a:r>
-              <a:rPr lang="en-US" dirty="0" smtClean="0">
+              <a:rPr lang="en-US" dirty="0">
                 <a:latin typeface="Courier New" panose="02070309020205020404" pitchFamily="49" charset="0"/>
                 <a:cs typeface="Courier New" panose="02070309020205020404" pitchFamily="49" charset="0"/>
               </a:rPr>
@@ -6190,7 +6094,7 @@
           </a:p>
           <a:p>
             <a:r>
-              <a:rPr lang="en-US" dirty="0" smtClean="0">
+              <a:rPr lang="en-US" dirty="0">
                 <a:latin typeface="Courier New" panose="02070309020205020404" pitchFamily="49" charset="0"/>
                 <a:cs typeface="Courier New" panose="02070309020205020404" pitchFamily="49" charset="0"/>
               </a:rPr>
@@ -6199,20 +6103,16 @@
           </a:p>
           <a:p>
             <a:r>
-              <a:rPr lang="en-US" dirty="0" smtClean="0">
+              <a:rPr lang="en-US" dirty="0">
                 <a:latin typeface="Courier New" panose="02070309020205020404" pitchFamily="49" charset="0"/>
                 <a:cs typeface="Courier New" panose="02070309020205020404" pitchFamily="49" charset="0"/>
               </a:rPr>
               <a:t>   a &lt;- a+1</a:t>
             </a:r>
-            <a:endParaRPr lang="en-US" dirty="0">
-              <a:latin typeface="Courier New" panose="02070309020205020404" pitchFamily="49" charset="0"/>
-              <a:cs typeface="Courier New" panose="02070309020205020404" pitchFamily="49" charset="0"/>
-            </a:endParaRPr>
-          </a:p>
-          <a:p>
-            <a:r>
-              <a:rPr lang="en-US" dirty="0" smtClean="0">
+          </a:p>
+          <a:p>
+            <a:r>
+              <a:rPr lang="en-US" dirty="0">
                 <a:latin typeface="Courier New" panose="02070309020205020404" pitchFamily="49" charset="0"/>
                 <a:cs typeface="Courier New" panose="02070309020205020404" pitchFamily="49" charset="0"/>
               </a:rPr>
@@ -6271,37 +6171,19 @@
           </a:p>
           <a:p>
             <a:r>
-              <a:rPr lang="en-US" dirty="0" err="1" smtClean="0">
+              <a:rPr lang="en-US" dirty="0" err="1">
                 <a:latin typeface="Courier New" panose="02070309020205020404" pitchFamily="49" charset="0"/>
                 <a:cs typeface="Courier New" panose="02070309020205020404" pitchFamily="49" charset="0"/>
               </a:rPr>
               <a:t>map_dbl</a:t>
             </a:r>
             <a:r>
-              <a:rPr lang="en-US" dirty="0" smtClean="0">
-                <a:latin typeface="Courier New" panose="02070309020205020404" pitchFamily="49" charset="0"/>
-                <a:cs typeface="Courier New" panose="02070309020205020404" pitchFamily="49" charset="0"/>
-              </a:rPr>
-              <a:t>(1:100</a:t>
-            </a:r>
-            <a:r>
               <a:rPr lang="en-US" dirty="0">
                 <a:latin typeface="Courier New" panose="02070309020205020404" pitchFamily="49" charset="0"/>
                 <a:cs typeface="Courier New" panose="02070309020205020404" pitchFamily="49" charset="0"/>
               </a:rPr>
-              <a:t>, </a:t>
-            </a:r>
-            <a:r>
-              <a:rPr lang="en-US" dirty="0" smtClean="0">
-                <a:latin typeface="Courier New" panose="02070309020205020404" pitchFamily="49" charset="0"/>
-                <a:cs typeface="Courier New" panose="02070309020205020404" pitchFamily="49" charset="0"/>
-              </a:rPr>
-              <a:t>function(a){a+1})</a:t>
-            </a:r>
-            <a:endParaRPr lang="en-US" dirty="0">
-              <a:latin typeface="Courier New" panose="02070309020205020404" pitchFamily="49" charset="0"/>
-              <a:cs typeface="Courier New" panose="02070309020205020404" pitchFamily="49" charset="0"/>
-            </a:endParaRPr>
+              <a:t>(1:100, function(a){a+1})</a:t>
+            </a:r>
           </a:p>
         </p:txBody>
       </p:sp>
@@ -6328,7 +6210,7 @@
           <a:lstStyle/>
           <a:p>
             <a:r>
-              <a:rPr lang="en-US" dirty="0" smtClean="0">
+              <a:rPr lang="en-US" dirty="0">
                 <a:latin typeface="Courier New" panose="02070309020205020404" pitchFamily="49" charset="0"/>
                 <a:cs typeface="Courier New" panose="02070309020205020404" pitchFamily="49" charset="0"/>
               </a:rPr>
@@ -6337,7 +6219,7 @@
           </a:p>
           <a:p>
             <a:r>
-              <a:rPr lang="en-US" dirty="0" smtClean="0">
+              <a:rPr lang="en-US" dirty="0">
                 <a:latin typeface="Courier New" panose="02070309020205020404" pitchFamily="49" charset="0"/>
                 <a:cs typeface="Courier New" panose="02070309020205020404" pitchFamily="49" charset="0"/>
               </a:rPr>
@@ -6387,7 +6269,7 @@
           <a:p>
             <a:pPr algn="ctr"/>
             <a:r>
-              <a:rPr lang="en-US" dirty="0" smtClean="0"/>
+              <a:rPr lang="en-US" dirty="0"/>
               <a:t>Base R loop</a:t>
             </a:r>
             <a:endParaRPr lang="he-IL" dirty="0"/>
@@ -6431,7 +6313,7 @@
           <a:p>
             <a:pPr algn="ctr"/>
             <a:r>
-              <a:rPr lang="en-US" dirty="0" smtClean="0"/>
+              <a:rPr lang="en-US" dirty="0"/>
               <a:t>Base R loop</a:t>
             </a:r>
             <a:endParaRPr lang="he-IL" dirty="0"/>
@@ -6446,24 +6328,22 @@
         </p:nvSpPr>
         <p:spPr>
           <a:xfrm>
-            <a:off x="9294471" y="3796496"/>
-            <a:ext cx="2106591" cy="416689"/>
+            <a:off x="8341567" y="3796496"/>
+            <a:ext cx="3059495" cy="416689"/>
           </a:xfrm>
           <a:prstGeom prst="roundRect">
             <a:avLst/>
           </a:prstGeom>
         </p:spPr>
         <p:style>
-          <a:lnRef idx="2">
-            <a:schemeClr val="accent4">
-              <a:shade val="50000"/>
-            </a:schemeClr>
+          <a:lnRef idx="3">
+            <a:schemeClr val="lt1"/>
           </a:lnRef>
           <a:fillRef idx="1">
-            <a:schemeClr val="accent4"/>
+            <a:schemeClr val="accent5"/>
           </a:fillRef>
-          <a:effectRef idx="0">
-            <a:schemeClr val="accent4"/>
+          <a:effectRef idx="1">
+            <a:schemeClr val="accent5"/>
           </a:effectRef>
           <a:fontRef idx="minor">
             <a:schemeClr val="lt1"/>
@@ -6480,7 +6360,7 @@
             </a:r>
             <a:r>
               <a:rPr lang="en-US" dirty="0"/>
-              <a:t> iteration</a:t>
+              <a:t> iteration C++ loop</a:t>
             </a:r>
             <a:endParaRPr lang="he-IL" dirty="0"/>
           </a:p>
@@ -6494,8 +6374,8 @@
         </p:nvSpPr>
         <p:spPr>
           <a:xfrm>
-            <a:off x="3206187" y="5509549"/>
-            <a:ext cx="2743200" cy="416689"/>
+            <a:off x="2425959" y="5509549"/>
+            <a:ext cx="3523428" cy="416689"/>
           </a:xfrm>
           <a:prstGeom prst="roundRect">
             <a:avLst/>
@@ -6523,8 +6403,8 @@
           <a:p>
             <a:pPr algn="ctr"/>
             <a:r>
-              <a:rPr lang="en-US" dirty="0" smtClean="0"/>
-              <a:t>core vector operation</a:t>
+              <a:rPr lang="en-US" dirty="0"/>
+              <a:t>core vector operation (C loop)</a:t>
             </a:r>
             <a:endParaRPr lang="he-IL" dirty="0"/>
           </a:p>
@@ -6538,7 +6418,7 @@
         </p:nvSpPr>
         <p:spPr>
           <a:xfrm>
-            <a:off x="729206" y="2546431"/>
+            <a:off x="928458" y="2534508"/>
             <a:ext cx="10938076" cy="3634451"/>
           </a:xfrm>
           <a:prstGeom prst="roundRect">
@@ -6567,7 +6447,7 @@
           <a:p>
             <a:pPr algn="ctr"/>
             <a:r>
-              <a:rPr lang="en-US" dirty="0" smtClean="0"/>
+              <a:rPr lang="en-US" dirty="0"/>
               <a:t>Answers will appear here after a click</a:t>
             </a:r>
             <a:endParaRPr lang="he-IL" dirty="0"/>
@@ -6706,7 +6586,7 @@
           <a:lstStyle/>
           <a:p>
             <a:r>
-              <a:rPr lang="en-US" dirty="0" smtClean="0"/>
+              <a:rPr lang="en-US" dirty="0"/>
               <a:t>Conditionals (if…else if…else)</a:t>
             </a:r>
             <a:endParaRPr lang="he-IL" dirty="0"/>
@@ -6734,13 +6614,13 @@
           <a:lstStyle/>
           <a:p>
             <a:r>
-              <a:rPr lang="en-US" dirty="0" smtClean="0"/>
+              <a:rPr lang="en-US" dirty="0"/>
               <a:t>Check a condition and decide what code should run</a:t>
             </a:r>
           </a:p>
           <a:p>
             <a:r>
-              <a:rPr lang="en-US" dirty="0" smtClean="0"/>
+              <a:rPr lang="en-US" dirty="0"/>
               <a:t>Very useful from within functions</a:t>
             </a:r>
             <a:endParaRPr lang="he-IL" dirty="0"/>
@@ -6763,7 +6643,7 @@
           <a:lstStyle/>
           <a:p>
             <a:r>
-              <a:rPr lang="en-US" smtClean="0"/>
+              <a:rPr lang="en-US"/>
               <a:t>Materials by Adi Sarid https://adisarid.github.io and http://www.sarid-ins.com</a:t>
             </a:r>
             <a:endParaRPr lang="en-US" dirty="0"/>
@@ -6816,7 +6696,7 @@
           <a:lstStyle/>
           <a:p>
             <a:r>
-              <a:rPr lang="en-US" dirty="0" smtClean="0">
+              <a:rPr lang="en-US" dirty="0">
                 <a:latin typeface="Courier New" panose="02070309020205020404" pitchFamily="49" charset="0"/>
                 <a:cs typeface="Courier New" panose="02070309020205020404" pitchFamily="49" charset="0"/>
               </a:rPr>
@@ -6825,7 +6705,7 @@
           </a:p>
           <a:p>
             <a:r>
-              <a:rPr lang="en-US" dirty="0" smtClean="0">
+              <a:rPr lang="en-US" dirty="0">
                 <a:latin typeface="Courier New" panose="02070309020205020404" pitchFamily="49" charset="0"/>
                 <a:cs typeface="Courier New" panose="02070309020205020404" pitchFamily="49" charset="0"/>
               </a:rPr>
@@ -6834,144 +6714,52 @@
           </a:p>
           <a:p>
             <a:r>
-              <a:rPr lang="en-US" dirty="0" smtClean="0">
-                <a:latin typeface="Courier New" panose="02070309020205020404" pitchFamily="49" charset="0"/>
-                <a:cs typeface="Courier New" panose="02070309020205020404" pitchFamily="49" charset="0"/>
-              </a:rPr>
-              <a:t>   </a:t>
-            </a:r>
-            <a:r>
               <a:rPr lang="en-US" dirty="0">
                 <a:latin typeface="Courier New" panose="02070309020205020404" pitchFamily="49" charset="0"/>
                 <a:cs typeface="Courier New" panose="02070309020205020404" pitchFamily="49" charset="0"/>
               </a:rPr>
-              <a:t>cat</a:t>
-            </a:r>
-            <a:r>
-              <a:rPr lang="en-US" dirty="0" smtClean="0">
-                <a:latin typeface="Courier New" panose="02070309020205020404" pitchFamily="49" charset="0"/>
-                <a:cs typeface="Courier New" panose="02070309020205020404" pitchFamily="49" charset="0"/>
-              </a:rPr>
-              <a:t>("a is a </a:t>
-            </a:r>
+              <a:t>   cat("a is a short vector")</a:t>
+            </a:r>
+          </a:p>
+          <a:p>
             <a:r>
               <a:rPr lang="en-US" dirty="0">
                 <a:latin typeface="Courier New" panose="02070309020205020404" pitchFamily="49" charset="0"/>
                 <a:cs typeface="Courier New" panose="02070309020205020404" pitchFamily="49" charset="0"/>
               </a:rPr>
-              <a:t>short </a:t>
-            </a:r>
-            <a:r>
-              <a:rPr lang="en-US" dirty="0" smtClean="0">
-                <a:latin typeface="Courier New" panose="02070309020205020404" pitchFamily="49" charset="0"/>
-                <a:cs typeface="Courier New" panose="02070309020205020404" pitchFamily="49" charset="0"/>
-              </a:rPr>
-              <a:t>vector")</a:t>
-            </a:r>
-          </a:p>
-          <a:p>
-            <a:r>
-              <a:rPr lang="en-US" dirty="0" smtClean="0">
-                <a:latin typeface="Courier New" panose="02070309020205020404" pitchFamily="49" charset="0"/>
-                <a:cs typeface="Courier New" panose="02070309020205020404" pitchFamily="49" charset="0"/>
-              </a:rPr>
               <a:t>} else if (length(a) &lt; 1000) {</a:t>
             </a:r>
           </a:p>
           <a:p>
-            <a:r>
-              <a:rPr lang="en-US" dirty="0" smtClean="0">
-                <a:latin typeface="Courier New" panose="02070309020205020404" pitchFamily="49" charset="0"/>
-                <a:cs typeface="Courier New" panose="02070309020205020404" pitchFamily="49" charset="0"/>
-              </a:rPr>
-              <a:t>   </a:t>
-            </a:r>
             <a:r>
               <a:rPr lang="en-US" dirty="0">
                 <a:latin typeface="Courier New" panose="02070309020205020404" pitchFamily="49" charset="0"/>
                 <a:cs typeface="Courier New" panose="02070309020205020404" pitchFamily="49" charset="0"/>
               </a:rPr>
-              <a:t>cat</a:t>
-            </a:r>
-            <a:r>
-              <a:rPr lang="en-US" dirty="0" smtClean="0">
-                <a:latin typeface="Courier New" panose="02070309020205020404" pitchFamily="49" charset="0"/>
-                <a:cs typeface="Courier New" panose="02070309020205020404" pitchFamily="49" charset="0"/>
-              </a:rPr>
-              <a:t>("a is a medium </a:t>
-            </a:r>
+              <a:t>   cat("a is a medium sized vector")</a:t>
+            </a:r>
+          </a:p>
+          <a:p>
             <a:r>
               <a:rPr lang="en-US" dirty="0">
                 <a:latin typeface="Courier New" panose="02070309020205020404" pitchFamily="49" charset="0"/>
                 <a:cs typeface="Courier New" panose="02070309020205020404" pitchFamily="49" charset="0"/>
               </a:rPr>
-              <a:t>sized </a:t>
-            </a:r>
-            <a:r>
-              <a:rPr lang="en-US" dirty="0" smtClean="0">
-                <a:latin typeface="Courier New" panose="02070309020205020404" pitchFamily="49" charset="0"/>
-                <a:cs typeface="Courier New" panose="02070309020205020404" pitchFamily="49" charset="0"/>
-              </a:rPr>
-              <a:t>vector")</a:t>
-            </a:r>
-            <a:endParaRPr lang="en-US" dirty="0">
-              <a:latin typeface="Courier New" panose="02070309020205020404" pitchFamily="49" charset="0"/>
-              <a:cs typeface="Courier New" panose="02070309020205020404" pitchFamily="49" charset="0"/>
-            </a:endParaRPr>
-          </a:p>
-          <a:p>
-            <a:r>
-              <a:rPr lang="en-US" dirty="0" smtClean="0">
-                <a:latin typeface="Courier New" panose="02070309020205020404" pitchFamily="49" charset="0"/>
-                <a:cs typeface="Courier New" panose="02070309020205020404" pitchFamily="49" charset="0"/>
-              </a:rPr>
               <a:t>} else {</a:t>
             </a:r>
           </a:p>
           <a:p>
-            <a:r>
-              <a:rPr lang="en-US" dirty="0" smtClean="0">
-                <a:latin typeface="Courier New" panose="02070309020205020404" pitchFamily="49" charset="0"/>
-                <a:cs typeface="Courier New" panose="02070309020205020404" pitchFamily="49" charset="0"/>
-              </a:rPr>
-              <a:t>   </a:t>
-            </a:r>
             <a:r>
               <a:rPr lang="en-US" dirty="0">
                 <a:latin typeface="Courier New" panose="02070309020205020404" pitchFamily="49" charset="0"/>
                 <a:cs typeface="Courier New" panose="02070309020205020404" pitchFamily="49" charset="0"/>
               </a:rPr>
-              <a:t>cat</a:t>
-            </a:r>
-            <a:r>
-              <a:rPr lang="en-US" dirty="0" smtClean="0">
-                <a:latin typeface="Courier New" panose="02070309020205020404" pitchFamily="49" charset="0"/>
-                <a:cs typeface="Courier New" panose="02070309020205020404" pitchFamily="49" charset="0"/>
-              </a:rPr>
-              <a:t>("a is a </a:t>
-            </a:r>
+              <a:t>   cat("a is a long vector")</a:t>
+            </a:r>
+          </a:p>
+          <a:p>
             <a:r>
               <a:rPr lang="en-US" dirty="0">
-                <a:latin typeface="Courier New" panose="02070309020205020404" pitchFamily="49" charset="0"/>
-                <a:cs typeface="Courier New" panose="02070309020205020404" pitchFamily="49" charset="0"/>
-              </a:rPr>
-              <a:t>long </a:t>
-            </a:r>
-            <a:r>
-              <a:rPr lang="en-US" dirty="0" smtClean="0">
-                <a:latin typeface="Courier New" panose="02070309020205020404" pitchFamily="49" charset="0"/>
-                <a:cs typeface="Courier New" panose="02070309020205020404" pitchFamily="49" charset="0"/>
-              </a:rPr>
-              <a:t>vector")</a:t>
-            </a:r>
-            <a:endParaRPr lang="en-US" dirty="0">
-              <a:latin typeface="Courier New" panose="02070309020205020404" pitchFamily="49" charset="0"/>
-              <a:cs typeface="Courier New" panose="02070309020205020404" pitchFamily="49" charset="0"/>
-            </a:endParaRPr>
-          </a:p>
-          <a:p>
-            <a:r>
-              <a:rPr lang="en-US" dirty="0" smtClean="0">
                 <a:latin typeface="Courier New" panose="02070309020205020404" pitchFamily="49" charset="0"/>
                 <a:cs typeface="Courier New" panose="02070309020205020404" pitchFamily="49" charset="0"/>
               </a:rPr>
@@ -6994,13 +6782,6 @@
   <p:clrMapOvr>
     <a:masterClrMapping/>
   </p:clrMapOvr>
-  <p:timing>
-    <p:tnLst>
-      <p:par>
-        <p:cTn id="1" dur="indefinite" restart="never" nodeType="tmRoot"/>
-      </p:par>
-    </p:tnLst>
-  </p:timing>
 </p:sld>
 </file>
 
@@ -7037,7 +6818,7 @@
           <a:lstStyle/>
           <a:p>
             <a:r>
-              <a:rPr lang="en-US" dirty="0" smtClean="0"/>
+              <a:rPr lang="en-US" dirty="0"/>
               <a:t>Time for some exercise</a:t>
             </a:r>
             <a:endParaRPr lang="he-IL" dirty="0"/>
@@ -7060,15 +6841,15 @@
           <a:lstStyle/>
           <a:p>
             <a:r>
-              <a:rPr lang="en-US" dirty="0" smtClean="0"/>
+              <a:rPr lang="en-US" dirty="0"/>
               <a:t>Open “01-Syntax, functions, loops, data </a:t>
             </a:r>
             <a:r>
-              <a:rPr lang="en-US" dirty="0" err="1" smtClean="0"/>
+              <a:rPr lang="en-US" dirty="0" err="1"/>
               <a:t>types.Rmd</a:t>
             </a:r>
             <a:r>
-              <a:rPr lang="en-US" dirty="0" smtClean="0"/>
+              <a:rPr lang="en-US" dirty="0"/>
               <a:t>” and start the exercise.</a:t>
             </a:r>
             <a:endParaRPr lang="he-IL" dirty="0"/>
@@ -7091,7 +6872,7 @@
           <a:lstStyle/>
           <a:p>
             <a:r>
-              <a:rPr lang="en-US" smtClean="0"/>
+              <a:rPr lang="en-US"/>
               <a:t>Materials by Adi Sarid https://adisarid.github.io and http://www.sarid-ins.com</a:t>
             </a:r>
             <a:endParaRPr lang="en-US" dirty="0"/>
@@ -7131,13 +6912,6 @@
   <p:clrMapOvr>
     <a:masterClrMapping/>
   </p:clrMapOvr>
-  <p:timing>
-    <p:tnLst>
-      <p:par>
-        <p:cTn id="1" dur="indefinite" restart="never" nodeType="tmRoot"/>
-      </p:par>
-    </p:tnLst>
-  </p:timing>
 </p:sld>
 </file>
 
@@ -7175,7 +6949,7 @@
           <a:p>
             <a:pPr rtl="0"/>
             <a:r>
-              <a:rPr lang="en-US" dirty="0" smtClean="0"/>
+              <a:rPr lang="en-US" dirty="0"/>
               <a:t>Syntax, functions, loops, and data types</a:t>
             </a:r>
             <a:endParaRPr lang="he-IL" dirty="0"/>
@@ -7198,7 +6972,7 @@
           <a:lstStyle/>
           <a:p>
             <a:r>
-              <a:rPr lang="en-US" dirty="0" smtClean="0"/>
+              <a:rPr lang="en-US" dirty="0"/>
               <a:t>March 2019</a:t>
             </a:r>
             <a:endParaRPr lang="he-IL" dirty="0"/>
@@ -7221,10 +6995,9 @@
           <a:lstStyle/>
           <a:p>
             <a:r>
-              <a:rPr lang="en-US" dirty="0" smtClean="0"/>
+              <a:rPr lang="en-US" dirty="0"/>
               <a:t>Materials by Adi Sarid https://adisarid.github.io and http://www.sarid-ins.com</a:t>
             </a:r>
-            <a:endParaRPr lang="en-US" dirty="0"/>
           </a:p>
         </p:txBody>
       </p:sp>
@@ -7262,13 +7035,6 @@
   <p:clrMapOvr>
     <a:masterClrMapping/>
   </p:clrMapOvr>
-  <p:timing>
-    <p:tnLst>
-      <p:par>
-        <p:cTn id="1" dur="indefinite" restart="never" nodeType="tmRoot"/>
-      </p:par>
-    </p:tnLst>
-  </p:timing>
 </p:sld>
 </file>
 
@@ -7307,7 +7073,7 @@
           <a:lstStyle/>
           <a:p>
             <a:r>
-              <a:rPr lang="en-US" dirty="0" smtClean="0"/>
+              <a:rPr lang="en-US" dirty="0"/>
               <a:t>Syntax types</a:t>
             </a:r>
             <a:endParaRPr lang="he-IL" dirty="0"/>
@@ -7330,7 +7096,7 @@
           <a:lstStyle/>
           <a:p>
             <a:r>
-              <a:rPr lang="en-US" smtClean="0"/>
+              <a:rPr lang="en-US"/>
               <a:t>Materials by Adi Sarid https://adisarid.github.io and http://www.sarid-ins.com</a:t>
             </a:r>
             <a:endParaRPr lang="en-US" dirty="0"/>
@@ -7397,7 +7163,7 @@
           <a:p>
             <a:pPr algn="ctr"/>
             <a:r>
-              <a:rPr lang="en-US" dirty="0" smtClean="0"/>
+              <a:rPr lang="en-US" dirty="0"/>
               <a:t>Syntax types</a:t>
             </a:r>
             <a:endParaRPr lang="he-IL" dirty="0"/>
@@ -7455,14 +7221,14 @@
             <a:p>
               <a:pPr algn="ctr"/>
               <a:r>
-                <a:rPr lang="en-US" dirty="0" smtClean="0"/>
+                <a:rPr lang="en-US" dirty="0"/>
                 <a:t>Loops</a:t>
               </a:r>
             </a:p>
             <a:p>
               <a:pPr algn="ctr"/>
               <a:r>
-                <a:rPr lang="en-US" dirty="0" smtClean="0"/>
+                <a:rPr lang="en-US" dirty="0"/>
                 <a:t>(for, while)</a:t>
               </a:r>
               <a:endParaRPr lang="he-IL" dirty="0"/>
@@ -7597,7 +7363,7 @@
               <a:p>
                 <a:pPr algn="ctr"/>
                 <a:r>
-                  <a:rPr lang="en-US" dirty="0" smtClean="0">
+                  <a:rPr lang="en-US" dirty="0">
                     <a:solidFill>
                       <a:sysClr val="windowText" lastClr="000000"/>
                     </a:solidFill>
@@ -7714,7 +7480,7 @@
             <a:lstStyle/>
             <a:p>
               <a:r>
-                <a:rPr lang="en-US" sz="3600" dirty="0" smtClean="0"/>
+                <a:rPr lang="en-US" sz="3600" dirty="0"/>
                 <a:t>Base-</a:t>
               </a:r>
               <a:endParaRPr lang="he-IL" sz="3600" dirty="0"/>
@@ -7919,7 +7685,7 @@
               <a:p>
                 <a:pPr algn="ctr"/>
                 <a:r>
-                  <a:rPr lang="en-US" dirty="0" smtClean="0"/>
+                  <a:rPr lang="en-US" dirty="0"/>
                   <a:t>Functional programming</a:t>
                 </a:r>
                 <a:endParaRPr lang="he-IL" dirty="0"/>
@@ -8248,7 +8014,7 @@
               <a:p>
                 <a:pPr algn="ctr"/>
                 <a:r>
-                  <a:rPr lang="en-US" dirty="0" smtClean="0"/>
+                  <a:rPr lang="en-US" dirty="0"/>
                   <a:t>Functions, conditionals (if)</a:t>
                 </a:r>
                 <a:endParaRPr lang="he-IL" dirty="0"/>
@@ -8292,7 +8058,7 @@
               <a:p>
                 <a:pPr algn="ctr"/>
                 <a:r>
-                  <a:rPr lang="en-US" dirty="0" smtClean="0"/>
+                  <a:rPr lang="en-US" dirty="0"/>
                   <a:t>Data types</a:t>
                 </a:r>
                 <a:endParaRPr lang="he-IL" dirty="0"/>
@@ -8388,13 +8154,13 @@
           <a:lstStyle/>
           <a:p>
             <a:r>
-              <a:rPr lang="en-US" dirty="0" smtClean="0"/>
+              <a:rPr lang="en-US" dirty="0"/>
               <a:t>What we’re going </a:t>
             </a:r>
           </a:p>
           <a:p>
             <a:r>
-              <a:rPr lang="en-US" dirty="0" smtClean="0"/>
+              <a:rPr lang="en-US" dirty="0"/>
               <a:t>to focus on today</a:t>
             </a:r>
             <a:endParaRPr lang="he-IL" dirty="0"/>
@@ -8860,7 +8626,7 @@
           <a:lstStyle/>
           <a:p>
             <a:r>
-              <a:rPr lang="en-US" dirty="0" smtClean="0"/>
+              <a:rPr lang="en-US" dirty="0"/>
               <a:t>A short quiz, in pairs</a:t>
             </a:r>
             <a:endParaRPr lang="he-IL" dirty="0"/>
@@ -8883,40 +8649,40 @@
           <a:lstStyle/>
           <a:p>
             <a:r>
-              <a:rPr lang="en-US" dirty="0" smtClean="0"/>
+              <a:rPr lang="en-US" dirty="0"/>
               <a:t>Name the </a:t>
             </a:r>
             <a:r>
-              <a:rPr lang="en-US" b="1" dirty="0" smtClean="0"/>
+              <a:rPr lang="en-US" b="1" dirty="0"/>
               <a:t>4</a:t>
             </a:r>
             <a:r>
-              <a:rPr lang="en-US" dirty="0" smtClean="0"/>
+              <a:rPr lang="en-US" dirty="0"/>
               <a:t> main base-r data types</a:t>
             </a:r>
           </a:p>
           <a:p>
             <a:pPr lvl="1"/>
             <a:r>
-              <a:rPr lang="en-US" dirty="0" smtClean="0"/>
+              <a:rPr lang="en-US" dirty="0"/>
               <a:t>Bonus if you can get that up to </a:t>
             </a:r>
             <a:r>
-              <a:rPr lang="en-US" b="1" dirty="0" smtClean="0"/>
+              <a:rPr lang="en-US" b="1" dirty="0"/>
               <a:t>6</a:t>
             </a:r>
           </a:p>
           <a:p>
             <a:pPr lvl="1"/>
             <a:r>
-              <a:rPr lang="en-US" dirty="0" smtClean="0"/>
+              <a:rPr lang="en-US" dirty="0"/>
               <a:t>Novice: you can guess by previous experience (e.g., with R or other programming languages or just general knowledge)</a:t>
             </a:r>
           </a:p>
           <a:p>
             <a:pPr lvl="1"/>
             <a:r>
-              <a:rPr lang="en-US" dirty="0" smtClean="0"/>
+              <a:rPr lang="en-US" dirty="0"/>
               <a:t>Intermediate: you should probably know this already…</a:t>
             </a:r>
             <a:endParaRPr lang="he-IL" dirty="0"/>
@@ -8939,7 +8705,7 @@
           <a:lstStyle/>
           <a:p>
             <a:r>
-              <a:rPr lang="en-US" smtClean="0"/>
+              <a:rPr lang="en-US"/>
               <a:t>Materials by Adi Sarid https://adisarid.github.io and http://www.sarid-ins.com</a:t>
             </a:r>
             <a:endParaRPr lang="en-US" dirty="0"/>
@@ -8979,13 +8745,6 @@
   <p:clrMapOvr>
     <a:masterClrMapping/>
   </p:clrMapOvr>
-  <p:timing>
-    <p:tnLst>
-      <p:par>
-        <p:cTn id="1" dur="indefinite" restart="never" nodeType="tmRoot"/>
-      </p:par>
-    </p:tnLst>
-  </p:timing>
 </p:sld>
 </file>
 
@@ -9046,26 +8805,26 @@
           <a:lstStyle/>
           <a:p>
             <a:r>
-              <a:rPr lang="en-US" dirty="0" smtClean="0"/>
+              <a:rPr lang="en-US" dirty="0"/>
               <a:t>Character (string)</a:t>
             </a:r>
           </a:p>
           <a:p>
             <a:r>
-              <a:rPr lang="en-US" dirty="0" smtClean="0"/>
+              <a:rPr lang="en-US" dirty="0"/>
               <a:t>Integer</a:t>
             </a:r>
-            <a:endParaRPr lang="he-IL" dirty="0" smtClean="0"/>
-          </a:p>
-          <a:p>
-            <a:r>
-              <a:rPr lang="en-US" dirty="0" smtClean="0"/>
+            <a:endParaRPr lang="he-IL" dirty="0"/>
+          </a:p>
+          <a:p>
+            <a:r>
+              <a:rPr lang="en-US" dirty="0"/>
               <a:t>Numeric</a:t>
             </a:r>
           </a:p>
           <a:p>
             <a:r>
-              <a:rPr lang="en-US" dirty="0" smtClean="0"/>
+              <a:rPr lang="en-US" dirty="0"/>
               <a:t>Logical (Boolean)</a:t>
             </a:r>
           </a:p>
@@ -9074,13 +8833,13 @@
           </a:p>
           <a:p>
             <a:r>
-              <a:rPr lang="en-US" dirty="0" smtClean="0"/>
+              <a:rPr lang="en-US" dirty="0"/>
               <a:t>POSIX (date)</a:t>
             </a:r>
           </a:p>
           <a:p>
             <a:r>
-              <a:rPr lang="en-US" dirty="0" smtClean="0"/>
+              <a:rPr lang="en-US" dirty="0"/>
               <a:t>factor </a:t>
             </a:r>
           </a:p>
@@ -9102,7 +8861,7 @@
           <a:lstStyle/>
           <a:p>
             <a:r>
-              <a:rPr lang="en-US" smtClean="0"/>
+              <a:rPr lang="en-US"/>
               <a:t>Materials by Adi Sarid https://adisarid.github.io and http://www.sarid-ins.com</a:t>
             </a:r>
             <a:endParaRPr lang="en-US" dirty="0"/>
@@ -9169,7 +8928,7 @@
           <a:p>
             <a:pPr algn="ctr"/>
             <a:r>
-              <a:rPr lang="en-US" dirty="0" smtClean="0"/>
+              <a:rPr lang="en-US" dirty="0"/>
               <a:t>Answers will appear here after click</a:t>
             </a:r>
             <a:endParaRPr lang="he-IL" dirty="0"/>
@@ -9308,7 +9067,7 @@
           <a:lstStyle/>
           <a:p>
             <a:r>
-              <a:rPr lang="en-US" dirty="0" smtClean="0"/>
+              <a:rPr lang="en-US" dirty="0"/>
               <a:t>How data types work?</a:t>
             </a:r>
             <a:endParaRPr lang="he-IL" dirty="0"/>
@@ -9331,22 +9090,22 @@
           <a:lstStyle/>
           <a:p>
             <a:r>
-              <a:rPr lang="en-US" dirty="0" smtClean="0"/>
+              <a:rPr lang="en-US" dirty="0"/>
               <a:t>The basic data types can join together to form more complex structures such as: vectors, </a:t>
             </a:r>
             <a:r>
-              <a:rPr lang="en-US" dirty="0" err="1" smtClean="0"/>
+              <a:rPr lang="en-US" dirty="0" err="1"/>
               <a:t>data.frames</a:t>
             </a:r>
             <a:r>
-              <a:rPr lang="en-US" dirty="0" smtClean="0"/>
+              <a:rPr lang="en-US" dirty="0"/>
               <a:t>, matrix, or even more complex structures called lists</a:t>
             </a:r>
           </a:p>
           <a:p>
             <a:pPr lvl="1"/>
             <a:r>
-              <a:rPr lang="en-US" dirty="0" smtClean="0"/>
+              <a:rPr lang="en-US" dirty="0"/>
               <a:t>You will cover most of these in the next exercise</a:t>
             </a:r>
             <a:endParaRPr lang="he-IL" dirty="0"/>
@@ -9369,7 +9128,7 @@
           <a:lstStyle/>
           <a:p>
             <a:r>
-              <a:rPr lang="en-US" smtClean="0"/>
+              <a:rPr lang="en-US"/>
               <a:t>Materials by Adi Sarid https://adisarid.github.io and http://www.sarid-ins.com</a:t>
             </a:r>
             <a:endParaRPr lang="en-US" dirty="0"/>
@@ -9439,7 +9198,7 @@
           <a:lstStyle/>
           <a:p>
             <a:r>
-              <a:rPr lang="en-US" dirty="0" smtClean="0">
+              <a:rPr lang="en-US" dirty="0">
                 <a:solidFill>
                   <a:schemeClr val="tx1"/>
                 </a:solidFill>
@@ -9494,7 +9253,7 @@
           <a:lstStyle/>
           <a:p>
             <a:r>
-              <a:rPr lang="en-US" dirty="0" smtClean="0">
+              <a:rPr lang="en-US" dirty="0">
                 <a:solidFill>
                   <a:schemeClr val="tx1"/>
                 </a:solidFill>
@@ -9578,7 +9337,7 @@
                     <a:p>
                       <a:pPr algn="l" rtl="1"/>
                       <a:r>
-                        <a:rPr lang="en-US" dirty="0" err="1" smtClean="0"/>
+                        <a:rPr lang="en-US" dirty="0" err="1"/>
                         <a:t>num</a:t>
                       </a:r>
                       <a:endParaRPr lang="he-IL" dirty="0"/>
@@ -9593,7 +9352,7 @@
                     <a:p>
                       <a:pPr algn="l" rtl="1"/>
                       <a:r>
-                        <a:rPr lang="en-US" dirty="0" smtClean="0"/>
+                        <a:rPr lang="en-US" dirty="0"/>
                         <a:t>date</a:t>
                       </a:r>
                       <a:endParaRPr lang="he-IL" dirty="0"/>
@@ -9608,7 +9367,7 @@
                     <a:p>
                       <a:pPr algn="l" rtl="1"/>
                       <a:r>
-                        <a:rPr lang="en-US" dirty="0" smtClean="0"/>
+                        <a:rPr lang="en-US" dirty="0"/>
                         <a:t>fact</a:t>
                       </a:r>
                       <a:endParaRPr lang="he-IL" dirty="0"/>
@@ -9623,7 +9382,7 @@
                     <a:p>
                       <a:pPr algn="l" rtl="1"/>
                       <a:r>
-                        <a:rPr lang="en-US" dirty="0" smtClean="0"/>
+                        <a:rPr lang="en-US" dirty="0"/>
                         <a:t>num2</a:t>
                       </a:r>
                       <a:endParaRPr lang="he-IL" dirty="0"/>
@@ -9638,7 +9397,7 @@
                     <a:p>
                       <a:pPr algn="l" rtl="1"/>
                       <a:r>
-                        <a:rPr lang="en-US" dirty="0" err="1" smtClean="0"/>
+                        <a:rPr lang="en-US" dirty="0" err="1"/>
                         <a:t>logi</a:t>
                       </a:r>
                       <a:endParaRPr lang="he-IL" dirty="0"/>
@@ -10475,7 +10234,7 @@
           <a:lstStyle/>
           <a:p>
             <a:r>
-              <a:rPr lang="en-US" dirty="0" smtClean="0">
+              <a:rPr lang="en-US" dirty="0">
                 <a:solidFill>
                   <a:schemeClr val="tx1"/>
                 </a:solidFill>
@@ -10884,15 +10643,15 @@
           <a:lstStyle/>
           <a:p>
             <a:r>
-              <a:rPr lang="en-US" dirty="0" smtClean="0"/>
+              <a:rPr lang="en-US" dirty="0"/>
               <a:t>The missing value (“</a:t>
             </a:r>
             <a:r>
-              <a:rPr lang="en-US" i="1" dirty="0" smtClean="0"/>
+              <a:rPr lang="en-US" i="1" dirty="0"/>
               <a:t>NA</a:t>
             </a:r>
             <a:r>
-              <a:rPr lang="en-US" dirty="0" smtClean="0"/>
+              <a:rPr lang="en-US" dirty="0"/>
               <a:t>”)</a:t>
             </a:r>
             <a:endParaRPr lang="he-IL" dirty="0"/>
@@ -10917,86 +10676,86 @@
           <a:lstStyle/>
           <a:p>
             <a:r>
-              <a:rPr lang="en-US" sz="1800" i="1" dirty="0" smtClean="0"/>
+              <a:rPr lang="en-US" sz="1800" i="1" dirty="0"/>
               <a:t>NA</a:t>
             </a:r>
             <a:r>
-              <a:rPr lang="en-US" sz="1800" dirty="0" smtClean="0"/>
+              <a:rPr lang="en-US" sz="1800" dirty="0"/>
               <a:t> is short for Not Available (or not applicable).</a:t>
             </a:r>
           </a:p>
           <a:p>
             <a:r>
-              <a:rPr lang="en-US" sz="1800" dirty="0" smtClean="0"/>
+              <a:rPr lang="en-US" sz="1800" dirty="0"/>
               <a:t>Objects in R can have </a:t>
             </a:r>
             <a:r>
-              <a:rPr lang="en-US" sz="1800" i="1" dirty="0" smtClean="0"/>
+              <a:rPr lang="en-US" sz="1800" i="1" dirty="0"/>
               <a:t>NA</a:t>
             </a:r>
             <a:r>
-              <a:rPr lang="en-US" sz="1800" dirty="0" smtClean="0"/>
+              <a:rPr lang="en-US" sz="1800" dirty="0"/>
               <a:t> as a value, e.g., a vector like </a:t>
             </a:r>
             <a:r>
-              <a:rPr lang="en-US" sz="1800" i="1" dirty="0" smtClean="0"/>
+              <a:rPr lang="en-US" sz="1800" i="1" dirty="0"/>
               <a:t>c(1, 2, NA, 10, 3)</a:t>
             </a:r>
             <a:r>
-              <a:rPr lang="en-US" sz="1800" dirty="0" smtClean="0"/>
+              <a:rPr lang="en-US" sz="1800" dirty="0"/>
               <a:t>.</a:t>
             </a:r>
           </a:p>
           <a:p>
             <a:r>
-              <a:rPr lang="en-US" sz="1800" dirty="0" smtClean="0"/>
+              <a:rPr lang="en-US" sz="1800" dirty="0"/>
               <a:t>This happens a lot with data.</a:t>
             </a:r>
           </a:p>
           <a:p>
             <a:r>
-              <a:rPr lang="en-US" sz="1800" dirty="0" smtClean="0"/>
+              <a:rPr lang="en-US" sz="1800" dirty="0"/>
               <a:t>Can you guess what the following will yield?</a:t>
             </a:r>
           </a:p>
           <a:p>
             <a:pPr lvl="1"/>
             <a:r>
-              <a:rPr lang="en-US" sz="1600" i="1" dirty="0" smtClean="0"/>
+              <a:rPr lang="en-US" sz="1600" i="1" dirty="0"/>
               <a:t>NA + 1</a:t>
             </a:r>
           </a:p>
           <a:p>
             <a:pPr lvl="1"/>
             <a:r>
-              <a:rPr lang="en-US" sz="1600" i="1" dirty="0" smtClean="0"/>
+              <a:rPr lang="en-US" sz="1600" i="1" dirty="0"/>
               <a:t>NA * 1</a:t>
             </a:r>
           </a:p>
           <a:p>
             <a:pPr lvl="1"/>
             <a:r>
-              <a:rPr lang="en-US" sz="1600" i="1" dirty="0" smtClean="0"/>
+              <a:rPr lang="en-US" sz="1600" i="1" dirty="0"/>
               <a:t>NA * 0</a:t>
             </a:r>
           </a:p>
           <a:p>
             <a:pPr lvl="1"/>
             <a:r>
-              <a:rPr lang="en-US" sz="1600" i="1" dirty="0" smtClean="0"/>
+              <a:rPr lang="en-US" sz="1600" i="1" dirty="0"/>
               <a:t>NA ^ 0</a:t>
             </a:r>
           </a:p>
           <a:p>
             <a:pPr lvl="1"/>
             <a:r>
-              <a:rPr lang="en-US" sz="1600" i="1" dirty="0" smtClean="0"/>
+              <a:rPr lang="en-US" sz="1600" i="1" dirty="0"/>
               <a:t>is.na(NA)</a:t>
             </a:r>
           </a:p>
           <a:p>
             <a:r>
-              <a:rPr lang="en-US" sz="1800" dirty="0" smtClean="0"/>
+              <a:rPr lang="en-US" sz="1800" dirty="0"/>
               <a:t>Using R’s console check if you were right. Can you explain this behavior?</a:t>
             </a:r>
           </a:p>
@@ -11018,7 +10777,7 @@
           <a:lstStyle/>
           <a:p>
             <a:r>
-              <a:rPr lang="en-US" smtClean="0"/>
+              <a:rPr lang="en-US"/>
               <a:t>Materials by Adi Sarid https://adisarid.github.io and http://www.sarid-ins.com</a:t>
             </a:r>
             <a:endParaRPr lang="en-US" dirty="0"/>
@@ -11151,7 +10910,7 @@
           <a:lstStyle/>
           <a:p>
             <a:r>
-              <a:rPr lang="en-US" dirty="0" smtClean="0"/>
+              <a:rPr lang="en-US" dirty="0"/>
               <a:t>2 minutes</a:t>
             </a:r>
             <a:endParaRPr lang="he-IL" dirty="0"/>
@@ -11344,27 +11103,27 @@
           <a:lstStyle/>
           <a:p>
             <a:r>
-              <a:rPr lang="en-US" dirty="0" err="1" smtClean="0"/>
+              <a:rPr lang="en-US" dirty="0" err="1"/>
               <a:t>Inf</a:t>
             </a:r>
             <a:r>
-              <a:rPr lang="en-US" dirty="0" smtClean="0"/>
+              <a:rPr lang="en-US" dirty="0"/>
               <a:t>, -</a:t>
             </a:r>
             <a:r>
-              <a:rPr lang="en-US" dirty="0" err="1" smtClean="0"/>
+              <a:rPr lang="en-US" dirty="0" err="1"/>
               <a:t>Inf</a:t>
             </a:r>
             <a:r>
-              <a:rPr lang="en-US" dirty="0" smtClean="0"/>
+              <a:rPr lang="en-US" dirty="0"/>
               <a:t>, </a:t>
             </a:r>
             <a:r>
-              <a:rPr lang="en-US" dirty="0" err="1" smtClean="0"/>
+              <a:rPr lang="en-US" dirty="0" err="1"/>
               <a:t>NaN</a:t>
             </a:r>
             <a:r>
-              <a:rPr lang="en-US" dirty="0" smtClean="0"/>
+              <a:rPr lang="en-US" dirty="0"/>
               <a:t>, NULL, </a:t>
             </a:r>
             <a:endParaRPr lang="he-IL" dirty="0"/>
@@ -11389,19 +11148,19 @@
           <a:lstStyle/>
           <a:p>
             <a:r>
-              <a:rPr lang="en-US" dirty="0" smtClean="0"/>
+              <a:rPr lang="en-US" dirty="0"/>
               <a:t>R can work with infinite values </a:t>
             </a:r>
             <a:r>
-              <a:rPr lang="en-US" i="1" dirty="0" err="1" smtClean="0"/>
+              <a:rPr lang="en-US" i="1" dirty="0" err="1"/>
               <a:t>Inf</a:t>
             </a:r>
             <a:r>
-              <a:rPr lang="en-US" dirty="0" smtClean="0"/>
+              <a:rPr lang="en-US" dirty="0"/>
               <a:t>, -</a:t>
             </a:r>
             <a:r>
-              <a:rPr lang="en-US" i="1" dirty="0" err="1" smtClean="0"/>
+              <a:rPr lang="en-US" i="1" dirty="0" err="1"/>
               <a:t>Inf</a:t>
             </a:r>
             <a:endParaRPr lang="en-US" i="1" dirty="0"/>
@@ -11409,102 +11168,102 @@
           <a:p>
             <a:pPr lvl="1"/>
             <a:r>
-              <a:rPr lang="en-US" dirty="0" smtClean="0"/>
+              <a:rPr lang="en-US" dirty="0"/>
               <a:t>What are they useful for?</a:t>
             </a:r>
           </a:p>
           <a:p>
             <a:r>
-              <a:rPr lang="en-US" i="1" dirty="0" err="1" smtClean="0"/>
+              <a:rPr lang="en-US" i="1" dirty="0" err="1"/>
               <a:t>NaN</a:t>
             </a:r>
             <a:r>
-              <a:rPr lang="en-US" dirty="0" smtClean="0"/>
+              <a:rPr lang="en-US" dirty="0"/>
               <a:t> is Not a Number (i.e., </a:t>
             </a:r>
             <a:r>
-              <a:rPr lang="en-US" i="1" dirty="0" smtClean="0"/>
+              <a:rPr lang="en-US" i="1" dirty="0"/>
               <a:t>log</a:t>
             </a:r>
             <a:r>
-              <a:rPr lang="en-US" dirty="0" smtClean="0"/>
+              <a:rPr lang="en-US" dirty="0"/>
               <a:t>(-</a:t>
             </a:r>
             <a:r>
-              <a:rPr lang="en-US" i="1" dirty="0" err="1" smtClean="0"/>
+              <a:rPr lang="en-US" i="1" dirty="0" err="1"/>
               <a:t>Inf</a:t>
             </a:r>
             <a:r>
-              <a:rPr lang="en-US" dirty="0" smtClean="0"/>
+              <a:rPr lang="en-US" dirty="0"/>
               <a:t>), </a:t>
             </a:r>
             <a:r>
-              <a:rPr lang="en-US" i="1" dirty="0" err="1" smtClean="0"/>
+              <a:rPr lang="en-US" i="1" dirty="0" err="1"/>
               <a:t>Inf</a:t>
             </a:r>
             <a:r>
-              <a:rPr lang="en-US" i="1" dirty="0" smtClean="0"/>
+              <a:rPr lang="en-US" i="1" dirty="0"/>
               <a:t>*0</a:t>
             </a:r>
             <a:r>
-              <a:rPr lang="en-US" dirty="0" smtClean="0"/>
+              <a:rPr lang="en-US" dirty="0"/>
               <a:t>)</a:t>
             </a:r>
           </a:p>
           <a:p>
             <a:r>
-              <a:rPr lang="en-US" i="1" dirty="0" smtClean="0"/>
+              <a:rPr lang="en-US" i="1" dirty="0"/>
               <a:t>NULL</a:t>
             </a:r>
             <a:r>
-              <a:rPr lang="en-US" dirty="0" smtClean="0"/>
+              <a:rPr lang="en-US" dirty="0"/>
               <a:t> is a null value, it can be used to initialize variables, or used as a return value for functions when they fail or yield no other result</a:t>
             </a:r>
           </a:p>
           <a:p>
             <a:r>
-              <a:rPr lang="en-US" dirty="0" smtClean="0"/>
+              <a:rPr lang="en-US" dirty="0"/>
               <a:t>A set of base-r functions can help us handle these special values:</a:t>
             </a:r>
           </a:p>
           <a:p>
             <a:pPr lvl="1"/>
             <a:r>
-              <a:rPr lang="en-US" i="1" dirty="0" smtClean="0"/>
+              <a:rPr lang="en-US" i="1" dirty="0"/>
               <a:t>is.na</a:t>
             </a:r>
           </a:p>
           <a:p>
             <a:pPr lvl="1"/>
             <a:r>
-              <a:rPr lang="en-US" i="1" dirty="0" err="1" smtClean="0"/>
+              <a:rPr lang="en-US" i="1" dirty="0" err="1"/>
               <a:t>is.finite</a:t>
             </a:r>
-            <a:endParaRPr lang="en-US" i="1" dirty="0" smtClean="0"/>
+            <a:endParaRPr lang="en-US" i="1" dirty="0"/>
           </a:p>
           <a:p>
             <a:pPr lvl="1"/>
             <a:r>
-              <a:rPr lang="en-US" i="1" dirty="0" err="1" smtClean="0"/>
+              <a:rPr lang="en-US" i="1" dirty="0" err="1"/>
               <a:t>is.infinite</a:t>
             </a:r>
-            <a:endParaRPr lang="en-US" i="1" dirty="0" smtClean="0"/>
+            <a:endParaRPr lang="en-US" i="1" dirty="0"/>
           </a:p>
           <a:p>
             <a:pPr lvl="1"/>
             <a:r>
-              <a:rPr lang="en-US" i="1" dirty="0" err="1" smtClean="0"/>
+              <a:rPr lang="en-US" i="1" dirty="0" err="1"/>
               <a:t>is.null</a:t>
             </a:r>
-            <a:endParaRPr lang="en-US" i="1" dirty="0" smtClean="0"/>
+            <a:endParaRPr lang="en-US" i="1" dirty="0"/>
           </a:p>
           <a:p>
             <a:pPr lvl="1"/>
             <a:r>
-              <a:rPr lang="en-US" i="1" dirty="0" err="1" smtClean="0"/>
+              <a:rPr lang="en-US" i="1" dirty="0" err="1"/>
               <a:t>is.nan</a:t>
             </a:r>
-            <a:endParaRPr lang="en-US" i="1" dirty="0" smtClean="0"/>
+            <a:endParaRPr lang="en-US" i="1" dirty="0"/>
           </a:p>
         </p:txBody>
       </p:sp>
@@ -11524,7 +11283,7 @@
           <a:lstStyle/>
           <a:p>
             <a:r>
-              <a:rPr lang="en-US" smtClean="0"/>
+              <a:rPr lang="en-US"/>
               <a:t>Materials by Adi Sarid https://adisarid.github.io and http://www.sarid-ins.com</a:t>
             </a:r>
             <a:endParaRPr lang="en-US" dirty="0"/>
@@ -11564,13 +11323,6 @@
   <p:clrMapOvr>
     <a:masterClrMapping/>
   </p:clrMapOvr>
-  <p:timing>
-    <p:tnLst>
-      <p:par>
-        <p:cTn id="1" dur="indefinite" restart="never" nodeType="tmRoot"/>
-      </p:par>
-    </p:tnLst>
-  </p:timing>
 </p:sld>
 </file>
 
@@ -11607,7 +11359,7 @@
           <a:lstStyle/>
           <a:p>
             <a:r>
-              <a:rPr lang="en-US" dirty="0" smtClean="0"/>
+              <a:rPr lang="en-US" dirty="0"/>
               <a:t>How functions work?</a:t>
             </a:r>
             <a:endParaRPr lang="he-IL" dirty="0"/>
@@ -11630,23 +11382,23 @@
           <a:lstStyle/>
           <a:p>
             <a:r>
-              <a:rPr lang="en-US" dirty="0" smtClean="0"/>
+              <a:rPr lang="en-US" dirty="0"/>
               <a:t>A function is code you write </a:t>
             </a:r>
             <a:r>
-              <a:rPr lang="en-US" b="1" dirty="0" smtClean="0"/>
+              <a:rPr lang="en-US" b="1" dirty="0"/>
               <a:t>once</a:t>
             </a:r>
             <a:r>
-              <a:rPr lang="en-US" dirty="0" smtClean="0"/>
+              <a:rPr lang="en-US" dirty="0"/>
               <a:t> when you want to use it </a:t>
             </a:r>
             <a:r>
-              <a:rPr lang="en-US" b="1" dirty="0" smtClean="0"/>
+              <a:rPr lang="en-US" b="1" dirty="0"/>
               <a:t>many times</a:t>
             </a:r>
             <a:r>
-              <a:rPr lang="en-US" dirty="0" smtClean="0"/>
+              <a:rPr lang="en-US" dirty="0"/>
               <a:t> perhaps with some variations. For example:</a:t>
             </a:r>
             <a:endParaRPr lang="he-IL" b="1" dirty="0"/>
@@ -11669,7 +11421,7 @@
           <a:lstStyle/>
           <a:p>
             <a:r>
-              <a:rPr lang="en-US" smtClean="0"/>
+              <a:rPr lang="en-US"/>
               <a:t>Materials by Adi Sarid https://adisarid.github.io and http://www.sarid-ins.com</a:t>
             </a:r>
             <a:endParaRPr lang="en-US" dirty="0"/>
@@ -11722,14 +11474,14 @@
           <a:lstStyle/>
           <a:p>
             <a:r>
-              <a:rPr lang="en-US" sz="2400" dirty="0" err="1" smtClean="0">
+              <a:rPr lang="en-US" sz="2400" dirty="0" err="1">
                 <a:latin typeface="Courier New" panose="02070309020205020404" pitchFamily="49" charset="0"/>
                 <a:cs typeface="Courier New" panose="02070309020205020404" pitchFamily="49" charset="0"/>
               </a:rPr>
               <a:t>oneplus</a:t>
             </a:r>
             <a:r>
-              <a:rPr lang="en-US" sz="2400" dirty="0" smtClean="0">
+              <a:rPr lang="en-US" sz="2400" dirty="0">
                 <a:latin typeface="Courier New" panose="02070309020205020404" pitchFamily="49" charset="0"/>
                 <a:cs typeface="Courier New" panose="02070309020205020404" pitchFamily="49" charset="0"/>
               </a:rPr>
@@ -11738,21 +11490,21 @@
           </a:p>
           <a:p>
             <a:r>
-              <a:rPr lang="en-US" sz="2400" dirty="0" smtClean="0">
+              <a:rPr lang="en-US" sz="2400" dirty="0">
                 <a:latin typeface="Courier New" panose="02070309020205020404" pitchFamily="49" charset="0"/>
                 <a:cs typeface="Courier New" panose="02070309020205020404" pitchFamily="49" charset="0"/>
               </a:rPr>
               <a:t>   </a:t>
             </a:r>
             <a:r>
-              <a:rPr lang="en-US" sz="2400" dirty="0" err="1" smtClean="0">
+              <a:rPr lang="en-US" sz="2400" dirty="0" err="1">
                 <a:latin typeface="Courier New" panose="02070309020205020404" pitchFamily="49" charset="0"/>
                 <a:cs typeface="Courier New" panose="02070309020205020404" pitchFamily="49" charset="0"/>
               </a:rPr>
               <a:t>new_number</a:t>
             </a:r>
             <a:r>
-              <a:rPr lang="en-US" sz="2400" dirty="0" smtClean="0">
+              <a:rPr lang="en-US" sz="2400" dirty="0">
                 <a:latin typeface="Courier New" panose="02070309020205020404" pitchFamily="49" charset="0"/>
                 <a:cs typeface="Courier New" panose="02070309020205020404" pitchFamily="49" charset="0"/>
               </a:rPr>
@@ -11765,29 +11517,33 @@
                 <a:latin typeface="Courier New" panose="02070309020205020404" pitchFamily="49" charset="0"/>
                 <a:cs typeface="Courier New" panose="02070309020205020404" pitchFamily="49" charset="0"/>
               </a:rPr>
-              <a:t> </a:t>
-            </a:r>
-            <a:r>
-              <a:rPr lang="en-US" sz="2400" dirty="0" smtClean="0">
-                <a:latin typeface="Courier New" panose="02070309020205020404" pitchFamily="49" charset="0"/>
-                <a:cs typeface="Courier New" panose="02070309020205020404" pitchFamily="49" charset="0"/>
-              </a:rPr>
-              <a:t>  return(</a:t>
-            </a:r>
-            <a:r>
-              <a:rPr lang="en-US" sz="2400" dirty="0" err="1" smtClean="0">
+              <a:t>   return(</a:t>
+            </a:r>
+            <a:r>
+              <a:rPr lang="en-US" sz="2400" dirty="0" err="1">
                 <a:latin typeface="Courier New" panose="02070309020205020404" pitchFamily="49" charset="0"/>
                 <a:cs typeface="Courier New" panose="02070309020205020404" pitchFamily="49" charset="0"/>
               </a:rPr>
               <a:t>new_number</a:t>
             </a:r>
             <a:r>
-              <a:rPr lang="en-US" sz="2400" dirty="0" smtClean="0">
+              <a:rPr lang="en-US" sz="2400" dirty="0">
                 <a:latin typeface="Courier New" panose="02070309020205020404" pitchFamily="49" charset="0"/>
                 <a:cs typeface="Courier New" panose="02070309020205020404" pitchFamily="49" charset="0"/>
               </a:rPr>
               <a:t>)</a:t>
             </a:r>
+          </a:p>
+          <a:p>
+            <a:r>
+              <a:rPr lang="en-US" sz="2400" dirty="0">
+                <a:latin typeface="Courier New" panose="02070309020205020404" pitchFamily="49" charset="0"/>
+                <a:cs typeface="Courier New" panose="02070309020205020404" pitchFamily="49" charset="0"/>
+              </a:rPr>
+              <a:t>}</a:t>
+            </a:r>
+          </a:p>
+          <a:p>
             <a:endParaRPr lang="en-US" sz="2400" dirty="0">
               <a:latin typeface="Courier New" panose="02070309020205020404" pitchFamily="49" charset="0"/>
               <a:cs typeface="Courier New" panose="02070309020205020404" pitchFamily="49" charset="0"/>
@@ -11795,29 +11551,14 @@
           </a:p>
           <a:p>
             <a:r>
-              <a:rPr lang="en-US" sz="2400" dirty="0" smtClean="0">
-                <a:latin typeface="Courier New" panose="02070309020205020404" pitchFamily="49" charset="0"/>
-                <a:cs typeface="Courier New" panose="02070309020205020404" pitchFamily="49" charset="0"/>
-              </a:rPr>
-              <a:t>}</a:t>
-            </a:r>
-          </a:p>
-          <a:p>
-            <a:endParaRPr lang="en-US" sz="2400" dirty="0">
-              <a:latin typeface="Courier New" panose="02070309020205020404" pitchFamily="49" charset="0"/>
-              <a:cs typeface="Courier New" panose="02070309020205020404" pitchFamily="49" charset="0"/>
-            </a:endParaRPr>
-          </a:p>
-          <a:p>
-            <a:r>
-              <a:rPr lang="en-US" sz="2400" dirty="0" err="1" smtClean="0">
+              <a:rPr lang="en-US" sz="2400" dirty="0" err="1">
                 <a:latin typeface="Courier New" panose="02070309020205020404" pitchFamily="49" charset="0"/>
                 <a:cs typeface="Courier New" panose="02070309020205020404" pitchFamily="49" charset="0"/>
               </a:rPr>
               <a:t>oneplus</a:t>
             </a:r>
             <a:r>
-              <a:rPr lang="en-US" sz="2400" dirty="0" smtClean="0">
+              <a:rPr lang="en-US" sz="2400" dirty="0">
                 <a:latin typeface="Courier New" panose="02070309020205020404" pitchFamily="49" charset="0"/>
                 <a:cs typeface="Courier New" panose="02070309020205020404" pitchFamily="49" charset="0"/>
               </a:rPr>
@@ -11826,28 +11567,28 @@
           </a:p>
           <a:p>
             <a:r>
-              <a:rPr lang="en-US" sz="2400" dirty="0" err="1" smtClean="0">
+              <a:rPr lang="en-US" sz="2400" dirty="0" err="1">
                 <a:latin typeface="Courier New" panose="02070309020205020404" pitchFamily="49" charset="0"/>
                 <a:cs typeface="Courier New" panose="02070309020205020404" pitchFamily="49" charset="0"/>
               </a:rPr>
               <a:t>oneplus</a:t>
             </a:r>
             <a:r>
-              <a:rPr lang="en-US" sz="2400" dirty="0" smtClean="0">
+              <a:rPr lang="en-US" sz="2400" dirty="0">
                 <a:latin typeface="Courier New" panose="02070309020205020404" pitchFamily="49" charset="0"/>
                 <a:cs typeface="Courier New" panose="02070309020205020404" pitchFamily="49" charset="0"/>
               </a:rPr>
               <a:t>(</a:t>
             </a:r>
             <a:r>
-              <a:rPr lang="en-US" sz="2400" dirty="0" err="1" smtClean="0">
+              <a:rPr lang="en-US" sz="2400" dirty="0" err="1">
                 <a:latin typeface="Courier New" panose="02070309020205020404" pitchFamily="49" charset="0"/>
                 <a:cs typeface="Courier New" panose="02070309020205020404" pitchFamily="49" charset="0"/>
               </a:rPr>
               <a:t>oneplus</a:t>
             </a:r>
             <a:r>
-              <a:rPr lang="en-US" sz="2400" dirty="0" smtClean="0">
+              <a:rPr lang="en-US" sz="2400" dirty="0">
                 <a:latin typeface="Courier New" panose="02070309020205020404" pitchFamily="49" charset="0"/>
                 <a:cs typeface="Courier New" panose="02070309020205020404" pitchFamily="49" charset="0"/>
               </a:rPr>
@@ -11917,7 +11658,7 @@
           <a:lstStyle/>
           <a:p>
             <a:r>
-              <a:rPr lang="en-US" dirty="0" smtClean="0"/>
+              <a:rPr lang="en-US" dirty="0"/>
               <a:t>function definition</a:t>
             </a:r>
             <a:endParaRPr lang="he-IL" dirty="0"/>
@@ -11985,7 +11726,7 @@
           <a:lstStyle/>
           <a:p>
             <a:r>
-              <a:rPr lang="en-US" dirty="0" smtClean="0"/>
+              <a:rPr lang="en-US" dirty="0"/>
               <a:t>function usage</a:t>
             </a:r>
             <a:endParaRPr lang="he-IL" dirty="0"/>

</xml_diff>

<commit_message>
Updated second presentation and added pdf version
</commit_message>
<xml_diff>
--- a/presentations/pptx/01-Syntax, functions, loops, data types.pptx
+++ b/presentations/pptx/01-Syntax, functions, loops, data types.pptx
@@ -5,7 +5,7 @@
     <p:sldMasterId id="2147483840" r:id="rId1"/>
   </p:sldMasterIdLst>
   <p:notesMasterIdLst>
-    <p:notesMasterId r:id="rId15"/>
+    <p:notesMasterId r:id="rId16"/>
   </p:notesMasterIdLst>
   <p:sldIdLst>
     <p:sldId id="257" r:id="rId2"/>
@@ -21,6 +21,7 @@
     <p:sldId id="266" r:id="rId12"/>
     <p:sldId id="267" r:id="rId13"/>
     <p:sldId id="268" r:id="rId14"/>
+    <p:sldId id="269" r:id="rId15"/>
   </p:sldIdLst>
   <p:sldSz cx="12192000" cy="6858000"/>
   <p:notesSz cx="6858000" cy="9144000"/>
@@ -220,7 +221,7 @@
           <a:p>
             <a:fld id="{5C93CA8F-50F8-44B5-B48F-4C4452AC4FCB}" type="datetimeFigureOut">
               <a:rPr lang="he-IL" smtClean="0"/>
-              <a:t>י"ד/אדר ב/תשע"ט</a:t>
+              <a:t>י"ז/אדר ב/תשע"ט</a:t>
             </a:fld>
             <a:endParaRPr lang="he-IL"/>
           </a:p>
@@ -6906,6 +6907,671 @@
     <p:extLst>
       <p:ext uri="{BB962C8B-B14F-4D97-AF65-F5344CB8AC3E}">
         <p14:creationId xmlns:p14="http://schemas.microsoft.com/office/powerpoint/2010/main" val="218184292"/>
+      </p:ext>
+    </p:extLst>
+  </p:cSld>
+  <p:clrMapOvr>
+    <a:masterClrMapping/>
+  </p:clrMapOvr>
+</p:sld>
+</file>
+
+<file path=ppt/slides/slide14.xml><?xml version="1.0" encoding="utf-8"?>
+<p:sld xmlns:a="http://schemas.openxmlformats.org/drawingml/2006/main" xmlns:r="http://schemas.openxmlformats.org/officeDocument/2006/relationships" xmlns:p="http://schemas.openxmlformats.org/presentationml/2006/main">
+  <p:cSld>
+    <p:spTree>
+      <p:nvGrpSpPr>
+        <p:cNvPr id="1" name=""/>
+        <p:cNvGrpSpPr/>
+        <p:nvPr/>
+      </p:nvGrpSpPr>
+      <p:grpSpPr>
+        <a:xfrm>
+          <a:off x="0" y="0"/>
+          <a:ext cx="0" cy="0"/>
+          <a:chOff x="0" y="0"/>
+          <a:chExt cx="0" cy="0"/>
+        </a:xfrm>
+      </p:grpSpPr>
+      <p:sp>
+        <p:nvSpPr>
+          <p:cNvPr id="2" name="Title 1">
+            <a:extLst>
+              <a:ext uri="{FF2B5EF4-FFF2-40B4-BE49-F238E27FC236}">
+                <a16:creationId xmlns:a16="http://schemas.microsoft.com/office/drawing/2014/main" id="{AE4DBA29-C55F-467A-A01E-13AD28004C68}"/>
+              </a:ext>
+            </a:extLst>
+          </p:cNvPr>
+          <p:cNvSpPr>
+            <a:spLocks noGrp="1"/>
+          </p:cNvSpPr>
+          <p:nvPr>
+            <p:ph type="title"/>
+          </p:nvPr>
+        </p:nvSpPr>
+        <p:spPr/>
+        <p:txBody>
+          <a:bodyPr/>
+          <a:lstStyle/>
+          <a:p>
+            <a:r>
+              <a:rPr lang="en-US" dirty="0"/>
+              <a:t>Debugging</a:t>
+            </a:r>
+            <a:endParaRPr lang="en-IL" dirty="0"/>
+          </a:p>
+        </p:txBody>
+      </p:sp>
+      <p:sp>
+        <p:nvSpPr>
+          <p:cNvPr id="3" name="Content Placeholder 2">
+            <a:extLst>
+              <a:ext uri="{FF2B5EF4-FFF2-40B4-BE49-F238E27FC236}">
+                <a16:creationId xmlns:a16="http://schemas.microsoft.com/office/drawing/2014/main" id="{4BD4522C-104D-4D09-8260-F9A800EE146F}"/>
+              </a:ext>
+            </a:extLst>
+          </p:cNvPr>
+          <p:cNvSpPr>
+            <a:spLocks noGrp="1"/>
+          </p:cNvSpPr>
+          <p:nvPr>
+            <p:ph idx="1"/>
+          </p:nvPr>
+        </p:nvSpPr>
+        <p:spPr/>
+        <p:txBody>
+          <a:bodyPr/>
+          <a:lstStyle/>
+          <a:p>
+            <a:r>
+              <a:rPr lang="en-US" dirty="0"/>
+              <a:t>A bug is an error which makes your program/function crash or to not work properly</a:t>
+            </a:r>
+          </a:p>
+          <a:p>
+            <a:r>
+              <a:rPr lang="en-US" dirty="0"/>
+              <a:t>Sometimes, bugs are hard to identify and to locate</a:t>
+            </a:r>
+          </a:p>
+          <a:p>
+            <a:endParaRPr lang="en-US" dirty="0"/>
+          </a:p>
+          <a:p>
+            <a:endParaRPr lang="en-US" dirty="0"/>
+          </a:p>
+          <a:p>
+            <a:r>
+              <a:rPr lang="en-US" dirty="0"/>
+              <a:t>RStudio has some built-in tools to help us debug our code</a:t>
+            </a:r>
+          </a:p>
+          <a:p>
+            <a:pPr lvl="1"/>
+            <a:r>
+              <a:rPr lang="en-US" dirty="0"/>
+              <a:t>Editor break points, next, step-in functions and continue</a:t>
+            </a:r>
+          </a:p>
+        </p:txBody>
+      </p:sp>
+      <p:sp>
+        <p:nvSpPr>
+          <p:cNvPr id="4" name="Footer Placeholder 3">
+            <a:extLst>
+              <a:ext uri="{FF2B5EF4-FFF2-40B4-BE49-F238E27FC236}">
+                <a16:creationId xmlns:a16="http://schemas.microsoft.com/office/drawing/2014/main" id="{9D71A6F8-C248-4BB6-9869-B5476BEA1231}"/>
+              </a:ext>
+            </a:extLst>
+          </p:cNvPr>
+          <p:cNvSpPr>
+            <a:spLocks noGrp="1"/>
+          </p:cNvSpPr>
+          <p:nvPr>
+            <p:ph type="ftr" sz="quarter" idx="11"/>
+          </p:nvPr>
+        </p:nvSpPr>
+        <p:spPr/>
+        <p:txBody>
+          <a:bodyPr/>
+          <a:lstStyle/>
+          <a:p>
+            <a:r>
+              <a:rPr lang="en-US"/>
+              <a:t>Materials by Adi Sarid https://adisarid.github.io and http://www.sarid-ins.com</a:t>
+            </a:r>
+            <a:endParaRPr lang="en-US" dirty="0"/>
+          </a:p>
+        </p:txBody>
+      </p:sp>
+      <p:sp>
+        <p:nvSpPr>
+          <p:cNvPr id="5" name="Slide Number Placeholder 4">
+            <a:extLst>
+              <a:ext uri="{FF2B5EF4-FFF2-40B4-BE49-F238E27FC236}">
+                <a16:creationId xmlns:a16="http://schemas.microsoft.com/office/drawing/2014/main" id="{13A546B7-FE09-4F76-890B-543C2496FBF9}"/>
+              </a:ext>
+            </a:extLst>
+          </p:cNvPr>
+          <p:cNvSpPr>
+            <a:spLocks noGrp="1"/>
+          </p:cNvSpPr>
+          <p:nvPr>
+            <p:ph type="sldNum" sz="quarter" idx="12"/>
+          </p:nvPr>
+        </p:nvSpPr>
+        <p:spPr/>
+        <p:txBody>
+          <a:bodyPr/>
+          <a:lstStyle/>
+          <a:p>
+            <a:fld id="{4FAB73BC-B049-4115-A692-8D63A059BFB8}" type="slidenum">
+              <a:rPr lang="en-US" smtClean="0"/>
+              <a:t>14</a:t>
+            </a:fld>
+            <a:endParaRPr lang="en-US" dirty="0"/>
+          </a:p>
+        </p:txBody>
+      </p:sp>
+      <p:pic>
+        <p:nvPicPr>
+          <p:cNvPr id="6" name="Picture 5">
+            <a:extLst>
+              <a:ext uri="{FF2B5EF4-FFF2-40B4-BE49-F238E27FC236}">
+                <a16:creationId xmlns:a16="http://schemas.microsoft.com/office/drawing/2014/main" id="{3FFAC507-320C-4CE9-91CC-0BB22857ACBC}"/>
+              </a:ext>
+            </a:extLst>
+          </p:cNvPr>
+          <p:cNvPicPr>
+            <a:picLocks noChangeAspect="1"/>
+          </p:cNvPicPr>
+          <p:nvPr/>
+        </p:nvPicPr>
+        <p:blipFill>
+          <a:blip r:embed="rId2"/>
+          <a:stretch>
+            <a:fillRect/>
+          </a:stretch>
+        </p:blipFill>
+        <p:spPr>
+          <a:xfrm>
+            <a:off x="9834466" y="1"/>
+            <a:ext cx="2357534" cy="1857354"/>
+          </a:xfrm>
+          <a:prstGeom prst="rect">
+            <a:avLst/>
+          </a:prstGeom>
+        </p:spPr>
+      </p:pic>
+      <p:sp>
+        <p:nvSpPr>
+          <p:cNvPr id="8" name="TextBox 7">
+            <a:hlinkClick r:id="rId3"/>
+            <a:extLst>
+              <a:ext uri="{FF2B5EF4-FFF2-40B4-BE49-F238E27FC236}">
+                <a16:creationId xmlns:a16="http://schemas.microsoft.com/office/drawing/2014/main" id="{B33F7146-4B7D-4007-A5AF-FD9E6144598E}"/>
+              </a:ext>
+            </a:extLst>
+          </p:cNvPr>
+          <p:cNvSpPr txBox="1"/>
+          <p:nvPr/>
+        </p:nvSpPr>
+        <p:spPr>
+          <a:xfrm>
+            <a:off x="10161030" y="1567540"/>
+            <a:ext cx="1814920" cy="261610"/>
+          </a:xfrm>
+          <a:prstGeom prst="rect">
+            <a:avLst/>
+          </a:prstGeom>
+          <a:noFill/>
+        </p:spPr>
+        <p:txBody>
+          <a:bodyPr wrap="none" rtlCol="0">
+            <a:spAutoFit/>
+          </a:bodyPr>
+          <a:lstStyle/>
+          <a:p>
+            <a:r>
+              <a:rPr lang="en-US" sz="1100" dirty="0" err="1"/>
+              <a:t>wikipedia</a:t>
+            </a:r>
+            <a:r>
+              <a:rPr lang="en-US" sz="1100" dirty="0"/>
+              <a:t>: software bug</a:t>
+            </a:r>
+            <a:endParaRPr lang="en-IL" sz="1100" dirty="0"/>
+          </a:p>
+        </p:txBody>
+      </p:sp>
+      <p:sp>
+        <p:nvSpPr>
+          <p:cNvPr id="9" name="Rectangle: Rounded Corners 8">
+            <a:extLst>
+              <a:ext uri="{FF2B5EF4-FFF2-40B4-BE49-F238E27FC236}">
+                <a16:creationId xmlns:a16="http://schemas.microsoft.com/office/drawing/2014/main" id="{827423B0-3BE7-498F-ACD9-8AFBA50FE829}"/>
+              </a:ext>
+            </a:extLst>
+          </p:cNvPr>
+          <p:cNvSpPr/>
+          <p:nvPr/>
+        </p:nvSpPr>
+        <p:spPr>
+          <a:xfrm>
+            <a:off x="1250302" y="3321698"/>
+            <a:ext cx="1735494" cy="653143"/>
+          </a:xfrm>
+          <a:prstGeom prst="roundRect">
+            <a:avLst/>
+          </a:prstGeom>
+        </p:spPr>
+        <p:style>
+          <a:lnRef idx="2">
+            <a:schemeClr val="accent1">
+              <a:shade val="50000"/>
+            </a:schemeClr>
+          </a:lnRef>
+          <a:fillRef idx="1">
+            <a:schemeClr val="accent1"/>
+          </a:fillRef>
+          <a:effectRef idx="0">
+            <a:schemeClr val="accent1"/>
+          </a:effectRef>
+          <a:fontRef idx="minor">
+            <a:schemeClr val="lt1"/>
+          </a:fontRef>
+        </p:style>
+        <p:txBody>
+          <a:bodyPr rtlCol="0" anchor="ctr"/>
+          <a:lstStyle/>
+          <a:p>
+            <a:pPr algn="ctr"/>
+            <a:r>
+              <a:rPr lang="en-US" dirty="0"/>
+              <a:t>Realize you have a bug</a:t>
+            </a:r>
+            <a:endParaRPr lang="en-IL" dirty="0"/>
+          </a:p>
+        </p:txBody>
+      </p:sp>
+      <p:sp>
+        <p:nvSpPr>
+          <p:cNvPr id="10" name="Rectangle: Rounded Corners 9">
+            <a:extLst>
+              <a:ext uri="{FF2B5EF4-FFF2-40B4-BE49-F238E27FC236}">
+                <a16:creationId xmlns:a16="http://schemas.microsoft.com/office/drawing/2014/main" id="{DCD45035-6EB7-4BA1-9270-D920DC116073}"/>
+              </a:ext>
+            </a:extLst>
+          </p:cNvPr>
+          <p:cNvSpPr/>
+          <p:nvPr/>
+        </p:nvSpPr>
+        <p:spPr>
+          <a:xfrm>
+            <a:off x="3800732" y="3321698"/>
+            <a:ext cx="2385464" cy="653143"/>
+          </a:xfrm>
+          <a:prstGeom prst="roundRect">
+            <a:avLst/>
+          </a:prstGeom>
+        </p:spPr>
+        <p:style>
+          <a:lnRef idx="2">
+            <a:schemeClr val="accent1">
+              <a:shade val="50000"/>
+            </a:schemeClr>
+          </a:lnRef>
+          <a:fillRef idx="1">
+            <a:schemeClr val="accent1"/>
+          </a:fillRef>
+          <a:effectRef idx="0">
+            <a:schemeClr val="accent1"/>
+          </a:effectRef>
+          <a:fontRef idx="minor">
+            <a:schemeClr val="lt1"/>
+          </a:fontRef>
+        </p:style>
+        <p:txBody>
+          <a:bodyPr rtlCol="0" anchor="ctr"/>
+          <a:lstStyle/>
+          <a:p>
+            <a:pPr algn="ctr"/>
+            <a:r>
+              <a:rPr lang="en-US" dirty="0"/>
+              <a:t>Make it repeatable (</a:t>
+            </a:r>
+            <a:r>
+              <a:rPr lang="en-US" dirty="0" err="1"/>
+              <a:t>reprex</a:t>
+            </a:r>
+            <a:r>
+              <a:rPr lang="en-US" dirty="0"/>
+              <a:t>)</a:t>
+            </a:r>
+            <a:endParaRPr lang="en-IL" dirty="0"/>
+          </a:p>
+        </p:txBody>
+      </p:sp>
+      <p:sp>
+        <p:nvSpPr>
+          <p:cNvPr id="11" name="Rectangle: Rounded Corners 10">
+            <a:extLst>
+              <a:ext uri="{FF2B5EF4-FFF2-40B4-BE49-F238E27FC236}">
+                <a16:creationId xmlns:a16="http://schemas.microsoft.com/office/drawing/2014/main" id="{667BD6A0-6A73-4DE1-BAD9-98CA5133491E}"/>
+              </a:ext>
+            </a:extLst>
+          </p:cNvPr>
+          <p:cNvSpPr/>
+          <p:nvPr/>
+        </p:nvSpPr>
+        <p:spPr>
+          <a:xfrm>
+            <a:off x="7001133" y="3321698"/>
+            <a:ext cx="1713660" cy="653143"/>
+          </a:xfrm>
+          <a:prstGeom prst="roundRect">
+            <a:avLst/>
+          </a:prstGeom>
+        </p:spPr>
+        <p:style>
+          <a:lnRef idx="2">
+            <a:schemeClr val="accent1">
+              <a:shade val="50000"/>
+            </a:schemeClr>
+          </a:lnRef>
+          <a:fillRef idx="1">
+            <a:schemeClr val="accent1"/>
+          </a:fillRef>
+          <a:effectRef idx="0">
+            <a:schemeClr val="accent1"/>
+          </a:effectRef>
+          <a:fontRef idx="minor">
+            <a:schemeClr val="lt1"/>
+          </a:fontRef>
+        </p:style>
+        <p:txBody>
+          <a:bodyPr rtlCol="0" anchor="ctr"/>
+          <a:lstStyle/>
+          <a:p>
+            <a:pPr algn="ctr"/>
+            <a:r>
+              <a:rPr lang="en-US" dirty="0"/>
+              <a:t>Figure out where it is</a:t>
+            </a:r>
+            <a:endParaRPr lang="en-IL" dirty="0"/>
+          </a:p>
+        </p:txBody>
+      </p:sp>
+      <p:sp>
+        <p:nvSpPr>
+          <p:cNvPr id="12" name="Rectangle: Rounded Corners 11">
+            <a:extLst>
+              <a:ext uri="{FF2B5EF4-FFF2-40B4-BE49-F238E27FC236}">
+                <a16:creationId xmlns:a16="http://schemas.microsoft.com/office/drawing/2014/main" id="{E40405D3-5711-47FC-A857-AB09BFA119B4}"/>
+              </a:ext>
+            </a:extLst>
+          </p:cNvPr>
+          <p:cNvSpPr/>
+          <p:nvPr/>
+        </p:nvSpPr>
+        <p:spPr>
+          <a:xfrm>
+            <a:off x="9529730" y="3321698"/>
+            <a:ext cx="1713660" cy="653143"/>
+          </a:xfrm>
+          <a:prstGeom prst="roundRect">
+            <a:avLst/>
+          </a:prstGeom>
+        </p:spPr>
+        <p:style>
+          <a:lnRef idx="2">
+            <a:schemeClr val="accent1">
+              <a:shade val="50000"/>
+            </a:schemeClr>
+          </a:lnRef>
+          <a:fillRef idx="1">
+            <a:schemeClr val="accent1"/>
+          </a:fillRef>
+          <a:effectRef idx="0">
+            <a:schemeClr val="accent1"/>
+          </a:effectRef>
+          <a:fontRef idx="minor">
+            <a:schemeClr val="lt1"/>
+          </a:fontRef>
+        </p:style>
+        <p:txBody>
+          <a:bodyPr rtlCol="0" anchor="ctr"/>
+          <a:lstStyle/>
+          <a:p>
+            <a:pPr algn="ctr"/>
+            <a:r>
+              <a:rPr lang="en-US" dirty="0"/>
+              <a:t>Fix it and test it</a:t>
+            </a:r>
+            <a:endParaRPr lang="en-IL" dirty="0"/>
+          </a:p>
+        </p:txBody>
+      </p:sp>
+      <p:cxnSp>
+        <p:nvCxnSpPr>
+          <p:cNvPr id="14" name="Straight Arrow Connector 13">
+            <a:extLst>
+              <a:ext uri="{FF2B5EF4-FFF2-40B4-BE49-F238E27FC236}">
+                <a16:creationId xmlns:a16="http://schemas.microsoft.com/office/drawing/2014/main" id="{D8A09471-2226-4699-B66A-24510ED3A39B}"/>
+              </a:ext>
+            </a:extLst>
+          </p:cNvPr>
+          <p:cNvCxnSpPr>
+            <a:stCxn id="9" idx="3"/>
+            <a:endCxn id="10" idx="1"/>
+          </p:cNvCxnSpPr>
+          <p:nvPr/>
+        </p:nvCxnSpPr>
+        <p:spPr>
+          <a:xfrm>
+            <a:off x="2985796" y="3648270"/>
+            <a:ext cx="814936" cy="0"/>
+          </a:xfrm>
+          <a:prstGeom prst="straightConnector1">
+            <a:avLst/>
+          </a:prstGeom>
+          <a:ln>
+            <a:tailEnd type="triangle"/>
+          </a:ln>
+        </p:spPr>
+        <p:style>
+          <a:lnRef idx="1">
+            <a:schemeClr val="accent1"/>
+          </a:lnRef>
+          <a:fillRef idx="0">
+            <a:schemeClr val="accent1"/>
+          </a:fillRef>
+          <a:effectRef idx="0">
+            <a:schemeClr val="accent1"/>
+          </a:effectRef>
+          <a:fontRef idx="minor">
+            <a:schemeClr val="tx1"/>
+          </a:fontRef>
+        </p:style>
+      </p:cxnSp>
+      <p:cxnSp>
+        <p:nvCxnSpPr>
+          <p:cNvPr id="16" name="Straight Arrow Connector 15">
+            <a:extLst>
+              <a:ext uri="{FF2B5EF4-FFF2-40B4-BE49-F238E27FC236}">
+                <a16:creationId xmlns:a16="http://schemas.microsoft.com/office/drawing/2014/main" id="{D53ECB06-4441-454F-88DA-7BCDEA5476ED}"/>
+              </a:ext>
+            </a:extLst>
+          </p:cNvPr>
+          <p:cNvCxnSpPr>
+            <a:stCxn id="10" idx="3"/>
+            <a:endCxn id="11" idx="1"/>
+          </p:cNvCxnSpPr>
+          <p:nvPr/>
+        </p:nvCxnSpPr>
+        <p:spPr>
+          <a:xfrm>
+            <a:off x="6186196" y="3648270"/>
+            <a:ext cx="814937" cy="0"/>
+          </a:xfrm>
+          <a:prstGeom prst="straightConnector1">
+            <a:avLst/>
+          </a:prstGeom>
+          <a:ln>
+            <a:tailEnd type="triangle"/>
+          </a:ln>
+        </p:spPr>
+        <p:style>
+          <a:lnRef idx="1">
+            <a:schemeClr val="accent1"/>
+          </a:lnRef>
+          <a:fillRef idx="0">
+            <a:schemeClr val="accent1"/>
+          </a:fillRef>
+          <a:effectRef idx="0">
+            <a:schemeClr val="accent1"/>
+          </a:effectRef>
+          <a:fontRef idx="minor">
+            <a:schemeClr val="tx1"/>
+          </a:fontRef>
+        </p:style>
+      </p:cxnSp>
+      <p:cxnSp>
+        <p:nvCxnSpPr>
+          <p:cNvPr id="18" name="Straight Arrow Connector 17">
+            <a:extLst>
+              <a:ext uri="{FF2B5EF4-FFF2-40B4-BE49-F238E27FC236}">
+                <a16:creationId xmlns:a16="http://schemas.microsoft.com/office/drawing/2014/main" id="{3F0A8CC9-F2CD-49F4-A41D-16949DF65599}"/>
+              </a:ext>
+            </a:extLst>
+          </p:cNvPr>
+          <p:cNvCxnSpPr>
+            <a:stCxn id="11" idx="3"/>
+            <a:endCxn id="12" idx="1"/>
+          </p:cNvCxnSpPr>
+          <p:nvPr/>
+        </p:nvCxnSpPr>
+        <p:spPr>
+          <a:xfrm>
+            <a:off x="8714793" y="3648270"/>
+            <a:ext cx="814937" cy="0"/>
+          </a:xfrm>
+          <a:prstGeom prst="straightConnector1">
+            <a:avLst/>
+          </a:prstGeom>
+          <a:ln>
+            <a:tailEnd type="triangle"/>
+          </a:ln>
+        </p:spPr>
+        <p:style>
+          <a:lnRef idx="1">
+            <a:schemeClr val="accent1"/>
+          </a:lnRef>
+          <a:fillRef idx="0">
+            <a:schemeClr val="accent1"/>
+          </a:fillRef>
+          <a:effectRef idx="0">
+            <a:schemeClr val="accent1"/>
+          </a:effectRef>
+          <a:fontRef idx="minor">
+            <a:schemeClr val="tx1"/>
+          </a:fontRef>
+        </p:style>
+      </p:cxnSp>
+      <p:pic>
+        <p:nvPicPr>
+          <p:cNvPr id="19" name="Picture 18">
+            <a:extLst>
+              <a:ext uri="{FF2B5EF4-FFF2-40B4-BE49-F238E27FC236}">
+                <a16:creationId xmlns:a16="http://schemas.microsoft.com/office/drawing/2014/main" id="{11A274FA-0609-4619-B669-3E1937B44F4F}"/>
+              </a:ext>
+            </a:extLst>
+          </p:cNvPr>
+          <p:cNvPicPr>
+            <a:picLocks noChangeAspect="1"/>
+          </p:cNvPicPr>
+          <p:nvPr/>
+        </p:nvPicPr>
+        <p:blipFill>
+          <a:blip r:embed="rId4"/>
+          <a:stretch>
+            <a:fillRect/>
+          </a:stretch>
+        </p:blipFill>
+        <p:spPr>
+          <a:xfrm>
+            <a:off x="642447" y="5000052"/>
+            <a:ext cx="2925213" cy="1003302"/>
+          </a:xfrm>
+          <a:prstGeom prst="rect">
+            <a:avLst/>
+          </a:prstGeom>
+        </p:spPr>
+      </p:pic>
+      <p:pic>
+        <p:nvPicPr>
+          <p:cNvPr id="20" name="Picture 19">
+            <a:extLst>
+              <a:ext uri="{FF2B5EF4-FFF2-40B4-BE49-F238E27FC236}">
+                <a16:creationId xmlns:a16="http://schemas.microsoft.com/office/drawing/2014/main" id="{399B3043-F714-4C95-BDE1-40991D906EA1}"/>
+              </a:ext>
+            </a:extLst>
+          </p:cNvPr>
+          <p:cNvPicPr>
+            <a:picLocks noChangeAspect="1"/>
+          </p:cNvPicPr>
+          <p:nvPr/>
+        </p:nvPicPr>
+        <p:blipFill>
+          <a:blip r:embed="rId5"/>
+          <a:stretch>
+            <a:fillRect/>
+          </a:stretch>
+        </p:blipFill>
+        <p:spPr>
+          <a:xfrm>
+            <a:off x="3964476" y="5140088"/>
+            <a:ext cx="2534622" cy="723230"/>
+          </a:xfrm>
+          <a:prstGeom prst="rect">
+            <a:avLst/>
+          </a:prstGeom>
+        </p:spPr>
+      </p:pic>
+      <p:pic>
+        <p:nvPicPr>
+          <p:cNvPr id="21" name="Picture 20">
+            <a:extLst>
+              <a:ext uri="{FF2B5EF4-FFF2-40B4-BE49-F238E27FC236}">
+                <a16:creationId xmlns:a16="http://schemas.microsoft.com/office/drawing/2014/main" id="{04E4AB67-D1A9-40C9-A460-A39AA4F6E023}"/>
+              </a:ext>
+            </a:extLst>
+          </p:cNvPr>
+          <p:cNvPicPr>
+            <a:picLocks noChangeAspect="1"/>
+          </p:cNvPicPr>
+          <p:nvPr/>
+        </p:nvPicPr>
+        <p:blipFill>
+          <a:blip r:embed="rId6"/>
+          <a:stretch>
+            <a:fillRect/>
+          </a:stretch>
+        </p:blipFill>
+        <p:spPr>
+          <a:xfrm>
+            <a:off x="7001133" y="5458722"/>
+            <a:ext cx="4629150" cy="228600"/>
+          </a:xfrm>
+          <a:prstGeom prst="rect">
+            <a:avLst/>
+          </a:prstGeom>
+        </p:spPr>
+      </p:pic>
+    </p:spTree>
+    <p:extLst>
+      <p:ext uri="{BB962C8B-B14F-4D97-AF65-F5344CB8AC3E}">
+        <p14:creationId xmlns:p14="http://schemas.microsoft.com/office/powerpoint/2010/main" val="423174109"/>
       </p:ext>
     </p:extLst>
   </p:cSld>

</xml_diff>